<commit_message>
zip file updated for the minior project1
</commit_message>
<xml_diff>
--- a/Minor-Project1/Titanic-Survival-Predition.pptx
+++ b/Minor-Project1/Titanic-Survival-Predition.pptx
@@ -70,29 +70,17 @@
             <a:noAutofit/>
           </a:bodyPr>
           <a:p>
+            <a:pPr algn="ctr">
+              <a:buNone/>
+            </a:pPr>
             <a:r>
-              <a:rPr b="0" lang="en-IN" sz="1800" spc="-1" strike="noStrike">
-                <a:solidFill>
-                  <a:srgbClr val="000000"/>
-                </a:solidFill>
-                <a:latin typeface="Calibri"/>
+              <a:rPr b="0" lang="en-IN" sz="4400" spc="-1" strike="noStrike">
+                <a:latin typeface="Arial"/>
               </a:rPr>
-              <a:t>Click to move the </a:t>
+              <a:t>Click to move the slide</a:t>
             </a:r>
-            <a:r>
-              <a:rPr b="0" lang="en-IN" sz="1800" spc="-1" strike="noStrike">
-                <a:solidFill>
-                  <a:srgbClr val="000000"/>
-                </a:solidFill>
-                <a:latin typeface="Calibri"/>
-              </a:rPr>
-              <a:t>slide</a:t>
-            </a:r>
-            <a:endParaRPr b="0" lang="en-IN" sz="1800" spc="-1" strike="noStrike">
-              <a:solidFill>
-                <a:srgbClr val="000000"/>
-              </a:solidFill>
-              <a:latin typeface="Calibri"/>
+            <a:endParaRPr b="0" lang="en-IN" sz="4400" spc="-1" strike="noStrike">
+              <a:latin typeface="Arial"/>
             </a:endParaRPr>
           </a:p>
         </p:txBody>
@@ -314,7 +302,7 @@
             <a:pPr algn="r">
               <a:buNone/>
             </a:pPr>
-            <a:fld id="{07E11999-61EC-43AB-9481-4FCC6A14753A}" type="slidenum">
+            <a:fld id="{17C973CA-A480-47DB-92E4-E5826AC4F24F}" type="slidenum">
               <a:rPr b="0" lang="en-IN" sz="1400" spc="-1" strike="noStrike">
                 <a:latin typeface="Times New Roman"/>
               </a:rPr>
@@ -351,7 +339,7 @@
       </p:grpSpPr>
       <p:sp>
         <p:nvSpPr>
-          <p:cNvPr id="176" name="PlaceHolder 1"/>
+          <p:cNvPr id="174" name="PlaceHolder 1"/>
           <p:cNvSpPr>
             <a:spLocks noGrp="1"/>
           </p:cNvSpPr>
@@ -362,19 +350,19 @@
         <p:spPr>
           <a:xfrm>
             <a:off x="685800" y="1143000"/>
-            <a:ext cx="5486040" cy="3085920"/>
-          </a:xfrm>
-          <a:prstGeom prst="rect">
-            <a:avLst/>
-          </a:prstGeom>
-          <a:ln w="0">
-            <a:noFill/>
-          </a:ln>
-        </p:spPr>
-      </p:sp>
-      <p:sp>
-        <p:nvSpPr>
-          <p:cNvPr id="177" name="PlaceHolder 2"/>
+            <a:ext cx="5485680" cy="3085560"/>
+          </a:xfrm>
+          <a:prstGeom prst="rect">
+            <a:avLst/>
+          </a:prstGeom>
+          <a:ln w="0">
+            <a:noFill/>
+          </a:ln>
+        </p:spPr>
+      </p:sp>
+      <p:sp>
+        <p:nvSpPr>
+          <p:cNvPr id="175" name="PlaceHolder 2"/>
           <p:cNvSpPr>
             <a:spLocks noGrp="1"/>
           </p:cNvSpPr>
@@ -385,18 +373,18 @@
         <p:spPr>
           <a:xfrm>
             <a:off x="685800" y="4400640"/>
-            <a:ext cx="5486040" cy="3600000"/>
-          </a:xfrm>
-          <a:prstGeom prst="rect">
-            <a:avLst/>
-          </a:prstGeom>
-          <a:noFill/>
-          <a:ln w="0">
-            <a:noFill/>
-          </a:ln>
-        </p:spPr>
-        <p:txBody>
-          <a:bodyPr anchor="t">
+            <a:ext cx="5485680" cy="3599640"/>
+          </a:xfrm>
+          <a:prstGeom prst="rect">
+            <a:avLst/>
+          </a:prstGeom>
+          <a:noFill/>
+          <a:ln w="0">
+            <a:noFill/>
+          </a:ln>
+        </p:spPr>
+        <p:txBody>
+          <a:bodyPr lIns="0" rIns="0" tIns="0" bIns="0" anchor="t">
             <a:noAutofit/>
           </a:bodyPr>
           <a:p>
@@ -408,7 +396,7 @@
       </p:sp>
       <p:sp>
         <p:nvSpPr>
-          <p:cNvPr id="178" name="PlaceHolder 3"/>
+          <p:cNvPr id="176" name="PlaceHolder 3"/>
           <p:cNvSpPr>
             <a:spLocks noGrp="1"/>
           </p:cNvSpPr>
@@ -419,18 +407,18 @@
         <p:spPr>
           <a:xfrm>
             <a:off x="3884760" y="8685360"/>
-            <a:ext cx="2971440" cy="458280"/>
-          </a:xfrm>
-          <a:prstGeom prst="rect">
-            <a:avLst/>
-          </a:prstGeom>
-          <a:noFill/>
-          <a:ln w="0">
-            <a:noFill/>
-          </a:ln>
-        </p:spPr>
-        <p:txBody>
-          <a:bodyPr anchor="b">
+            <a:ext cx="2971080" cy="457920"/>
+          </a:xfrm>
+          <a:prstGeom prst="rect">
+            <a:avLst/>
+          </a:prstGeom>
+          <a:noFill/>
+          <a:ln w="0">
+            <a:noFill/>
+          </a:ln>
+        </p:spPr>
+        <p:txBody>
+          <a:bodyPr lIns="0" rIns="0" tIns="0" bIns="0" anchor="b">
             <a:noAutofit/>
           </a:bodyPr>
           <a:lstStyle>
@@ -455,7 +443,7 @@
               </a:lnSpc>
               <a:buNone/>
             </a:pPr>
-            <a:fld id="{14A33DF4-C75A-4B91-8161-1B51E1AEFA02}" type="slidenum">
+            <a:fld id="{D38A8A23-5FBF-410A-9A6C-E45B9821642C}" type="slidenum">
               <a:rPr b="0" lang="en-US" sz="1200" spc="-1" strike="noStrike">
                 <a:solidFill>
                   <a:srgbClr val="000000"/>
@@ -495,7 +483,7 @@
       </p:grpSpPr>
       <p:sp>
         <p:nvSpPr>
-          <p:cNvPr id="203" name="PlaceHolder 1"/>
+          <p:cNvPr id="201" name="PlaceHolder 1"/>
           <p:cNvSpPr>
             <a:spLocks noGrp="1"/>
           </p:cNvSpPr>
@@ -506,19 +494,19 @@
         <p:spPr>
           <a:xfrm>
             <a:off x="685800" y="1143000"/>
-            <a:ext cx="5486040" cy="3085920"/>
-          </a:xfrm>
-          <a:prstGeom prst="rect">
-            <a:avLst/>
-          </a:prstGeom>
-          <a:ln w="0">
-            <a:noFill/>
-          </a:ln>
-        </p:spPr>
-      </p:sp>
-      <p:sp>
-        <p:nvSpPr>
-          <p:cNvPr id="204" name="PlaceHolder 2"/>
+            <a:ext cx="5485680" cy="3085560"/>
+          </a:xfrm>
+          <a:prstGeom prst="rect">
+            <a:avLst/>
+          </a:prstGeom>
+          <a:ln w="0">
+            <a:noFill/>
+          </a:ln>
+        </p:spPr>
+      </p:sp>
+      <p:sp>
+        <p:nvSpPr>
+          <p:cNvPr id="202" name="PlaceHolder 2"/>
           <p:cNvSpPr>
             <a:spLocks noGrp="1"/>
           </p:cNvSpPr>
@@ -529,18 +517,18 @@
         <p:spPr>
           <a:xfrm>
             <a:off x="685800" y="4400640"/>
-            <a:ext cx="5486040" cy="3600000"/>
-          </a:xfrm>
-          <a:prstGeom prst="rect">
-            <a:avLst/>
-          </a:prstGeom>
-          <a:noFill/>
-          <a:ln w="0">
-            <a:noFill/>
-          </a:ln>
-        </p:spPr>
-        <p:txBody>
-          <a:bodyPr anchor="t">
+            <a:ext cx="5485680" cy="3599640"/>
+          </a:xfrm>
+          <a:prstGeom prst="rect">
+            <a:avLst/>
+          </a:prstGeom>
+          <a:noFill/>
+          <a:ln w="0">
+            <a:noFill/>
+          </a:ln>
+        </p:spPr>
+        <p:txBody>
+          <a:bodyPr lIns="0" rIns="0" tIns="0" bIns="0" anchor="t">
             <a:noAutofit/>
           </a:bodyPr>
           <a:p>
@@ -552,7 +540,7 @@
       </p:sp>
       <p:sp>
         <p:nvSpPr>
-          <p:cNvPr id="205" name="PlaceHolder 3"/>
+          <p:cNvPr id="203" name="PlaceHolder 3"/>
           <p:cNvSpPr>
             <a:spLocks noGrp="1"/>
           </p:cNvSpPr>
@@ -563,18 +551,18 @@
         <p:spPr>
           <a:xfrm>
             <a:off x="3884760" y="8685360"/>
-            <a:ext cx="2971440" cy="458280"/>
-          </a:xfrm>
-          <a:prstGeom prst="rect">
-            <a:avLst/>
-          </a:prstGeom>
-          <a:noFill/>
-          <a:ln w="0">
-            <a:noFill/>
-          </a:ln>
-        </p:spPr>
-        <p:txBody>
-          <a:bodyPr anchor="b">
+            <a:ext cx="2971080" cy="457920"/>
+          </a:xfrm>
+          <a:prstGeom prst="rect">
+            <a:avLst/>
+          </a:prstGeom>
+          <a:noFill/>
+          <a:ln w="0">
+            <a:noFill/>
+          </a:ln>
+        </p:spPr>
+        <p:txBody>
+          <a:bodyPr lIns="0" rIns="0" tIns="0" bIns="0" anchor="b">
             <a:noAutofit/>
           </a:bodyPr>
           <a:lstStyle>
@@ -599,7 +587,7 @@
               </a:lnSpc>
               <a:buNone/>
             </a:pPr>
-            <a:fld id="{51DCE675-720A-40B3-9E16-7DEC5C1ED8D2}" type="slidenum">
+            <a:fld id="{4EA90BD9-3F13-4FA4-B8F9-EDA8A77DF9F7}" type="slidenum">
               <a:rPr b="0" lang="en-US" sz="1200" spc="-1" strike="noStrike">
                 <a:solidFill>
                   <a:srgbClr val="000000"/>
@@ -639,7 +627,7 @@
       </p:grpSpPr>
       <p:sp>
         <p:nvSpPr>
-          <p:cNvPr id="206" name="PlaceHolder 1"/>
+          <p:cNvPr id="204" name="PlaceHolder 1"/>
           <p:cNvSpPr>
             <a:spLocks noGrp="1"/>
           </p:cNvSpPr>
@@ -650,19 +638,19 @@
         <p:spPr>
           <a:xfrm>
             <a:off x="685800" y="1143000"/>
-            <a:ext cx="5486040" cy="3085920"/>
-          </a:xfrm>
-          <a:prstGeom prst="rect">
-            <a:avLst/>
-          </a:prstGeom>
-          <a:ln w="0">
-            <a:noFill/>
-          </a:ln>
-        </p:spPr>
-      </p:sp>
-      <p:sp>
-        <p:nvSpPr>
-          <p:cNvPr id="207" name="PlaceHolder 2"/>
+            <a:ext cx="5485680" cy="3085560"/>
+          </a:xfrm>
+          <a:prstGeom prst="rect">
+            <a:avLst/>
+          </a:prstGeom>
+          <a:ln w="0">
+            <a:noFill/>
+          </a:ln>
+        </p:spPr>
+      </p:sp>
+      <p:sp>
+        <p:nvSpPr>
+          <p:cNvPr id="205" name="PlaceHolder 2"/>
           <p:cNvSpPr>
             <a:spLocks noGrp="1"/>
           </p:cNvSpPr>
@@ -673,18 +661,18 @@
         <p:spPr>
           <a:xfrm>
             <a:off x="685800" y="4400640"/>
-            <a:ext cx="5486040" cy="3600000"/>
-          </a:xfrm>
-          <a:prstGeom prst="rect">
-            <a:avLst/>
-          </a:prstGeom>
-          <a:noFill/>
-          <a:ln w="0">
-            <a:noFill/>
-          </a:ln>
-        </p:spPr>
-        <p:txBody>
-          <a:bodyPr anchor="t">
+            <a:ext cx="5485680" cy="3599640"/>
+          </a:xfrm>
+          <a:prstGeom prst="rect">
+            <a:avLst/>
+          </a:prstGeom>
+          <a:noFill/>
+          <a:ln w="0">
+            <a:noFill/>
+          </a:ln>
+        </p:spPr>
+        <p:txBody>
+          <a:bodyPr lIns="0" rIns="0" tIns="0" bIns="0" anchor="t">
             <a:noAutofit/>
           </a:bodyPr>
           <a:p>
@@ -696,7 +684,7 @@
       </p:sp>
       <p:sp>
         <p:nvSpPr>
-          <p:cNvPr id="208" name="PlaceHolder 3"/>
+          <p:cNvPr id="206" name="PlaceHolder 3"/>
           <p:cNvSpPr>
             <a:spLocks noGrp="1"/>
           </p:cNvSpPr>
@@ -707,18 +695,18 @@
         <p:spPr>
           <a:xfrm>
             <a:off x="3884760" y="8685360"/>
-            <a:ext cx="2971440" cy="458280"/>
-          </a:xfrm>
-          <a:prstGeom prst="rect">
-            <a:avLst/>
-          </a:prstGeom>
-          <a:noFill/>
-          <a:ln w="0">
-            <a:noFill/>
-          </a:ln>
-        </p:spPr>
-        <p:txBody>
-          <a:bodyPr anchor="b">
+            <a:ext cx="2971080" cy="457920"/>
+          </a:xfrm>
+          <a:prstGeom prst="rect">
+            <a:avLst/>
+          </a:prstGeom>
+          <a:noFill/>
+          <a:ln w="0">
+            <a:noFill/>
+          </a:ln>
+        </p:spPr>
+        <p:txBody>
+          <a:bodyPr lIns="0" rIns="0" tIns="0" bIns="0" anchor="b">
             <a:noAutofit/>
           </a:bodyPr>
           <a:lstStyle>
@@ -743,7 +731,7 @@
               </a:lnSpc>
               <a:buNone/>
             </a:pPr>
-            <a:fld id="{CDB1AAFE-0E70-4AF3-8F42-9F3B064978F3}" type="slidenum">
+            <a:fld id="{9137FC24-F3CB-47F8-8AC7-14EC96EEB764}" type="slidenum">
               <a:rPr b="0" lang="en-US" sz="1200" spc="-1" strike="noStrike">
                 <a:solidFill>
                   <a:srgbClr val="000000"/>
@@ -783,7 +771,7 @@
       </p:grpSpPr>
       <p:sp>
         <p:nvSpPr>
-          <p:cNvPr id="179" name="PlaceHolder 1"/>
+          <p:cNvPr id="177" name="PlaceHolder 1"/>
           <p:cNvSpPr>
             <a:spLocks noGrp="1"/>
           </p:cNvSpPr>
@@ -794,19 +782,19 @@
         <p:spPr>
           <a:xfrm>
             <a:off x="685800" y="1143000"/>
-            <a:ext cx="5486040" cy="3085920"/>
-          </a:xfrm>
-          <a:prstGeom prst="rect">
-            <a:avLst/>
-          </a:prstGeom>
-          <a:ln w="0">
-            <a:noFill/>
-          </a:ln>
-        </p:spPr>
-      </p:sp>
-      <p:sp>
-        <p:nvSpPr>
-          <p:cNvPr id="180" name="PlaceHolder 2"/>
+            <a:ext cx="5485680" cy="3085560"/>
+          </a:xfrm>
+          <a:prstGeom prst="rect">
+            <a:avLst/>
+          </a:prstGeom>
+          <a:ln w="0">
+            <a:noFill/>
+          </a:ln>
+        </p:spPr>
+      </p:sp>
+      <p:sp>
+        <p:nvSpPr>
+          <p:cNvPr id="178" name="PlaceHolder 2"/>
           <p:cNvSpPr>
             <a:spLocks noGrp="1"/>
           </p:cNvSpPr>
@@ -817,18 +805,18 @@
         <p:spPr>
           <a:xfrm>
             <a:off x="685800" y="4400640"/>
-            <a:ext cx="5486040" cy="3600000"/>
-          </a:xfrm>
-          <a:prstGeom prst="rect">
-            <a:avLst/>
-          </a:prstGeom>
-          <a:noFill/>
-          <a:ln w="0">
-            <a:noFill/>
-          </a:ln>
-        </p:spPr>
-        <p:txBody>
-          <a:bodyPr anchor="t">
+            <a:ext cx="5485680" cy="3599640"/>
+          </a:xfrm>
+          <a:prstGeom prst="rect">
+            <a:avLst/>
+          </a:prstGeom>
+          <a:noFill/>
+          <a:ln w="0">
+            <a:noFill/>
+          </a:ln>
+        </p:spPr>
+        <p:txBody>
+          <a:bodyPr lIns="0" rIns="0" tIns="0" bIns="0" anchor="t">
             <a:noAutofit/>
           </a:bodyPr>
           <a:p>
@@ -840,7 +828,7 @@
       </p:sp>
       <p:sp>
         <p:nvSpPr>
-          <p:cNvPr id="181" name="PlaceHolder 3"/>
+          <p:cNvPr id="179" name="PlaceHolder 3"/>
           <p:cNvSpPr>
             <a:spLocks noGrp="1"/>
           </p:cNvSpPr>
@@ -851,18 +839,18 @@
         <p:spPr>
           <a:xfrm>
             <a:off x="3884760" y="8685360"/>
-            <a:ext cx="2971440" cy="458280"/>
-          </a:xfrm>
-          <a:prstGeom prst="rect">
-            <a:avLst/>
-          </a:prstGeom>
-          <a:noFill/>
-          <a:ln w="0">
-            <a:noFill/>
-          </a:ln>
-        </p:spPr>
-        <p:txBody>
-          <a:bodyPr anchor="b">
+            <a:ext cx="2971080" cy="457920"/>
+          </a:xfrm>
+          <a:prstGeom prst="rect">
+            <a:avLst/>
+          </a:prstGeom>
+          <a:noFill/>
+          <a:ln w="0">
+            <a:noFill/>
+          </a:ln>
+        </p:spPr>
+        <p:txBody>
+          <a:bodyPr lIns="0" rIns="0" tIns="0" bIns="0" anchor="b">
             <a:noAutofit/>
           </a:bodyPr>
           <a:lstStyle>
@@ -887,7 +875,7 @@
               </a:lnSpc>
               <a:buNone/>
             </a:pPr>
-            <a:fld id="{C5B42CBC-6E07-4935-A550-286D1BB86A3A}" type="slidenum">
+            <a:fld id="{C18361F5-DAC9-4B03-A2FB-160DD0F81E87}" type="slidenum">
               <a:rPr b="0" lang="en-US" sz="1200" spc="-1" strike="noStrike">
                 <a:solidFill>
                   <a:srgbClr val="000000"/>
@@ -927,7 +915,7 @@
       </p:grpSpPr>
       <p:sp>
         <p:nvSpPr>
-          <p:cNvPr id="182" name="PlaceHolder 1"/>
+          <p:cNvPr id="180" name="PlaceHolder 1"/>
           <p:cNvSpPr>
             <a:spLocks noGrp="1"/>
           </p:cNvSpPr>
@@ -938,19 +926,19 @@
         <p:spPr>
           <a:xfrm>
             <a:off x="685800" y="1143000"/>
-            <a:ext cx="5486040" cy="3085920"/>
-          </a:xfrm>
-          <a:prstGeom prst="rect">
-            <a:avLst/>
-          </a:prstGeom>
-          <a:ln w="0">
-            <a:noFill/>
-          </a:ln>
-        </p:spPr>
-      </p:sp>
-      <p:sp>
-        <p:nvSpPr>
-          <p:cNvPr id="183" name="PlaceHolder 2"/>
+            <a:ext cx="5485680" cy="3085560"/>
+          </a:xfrm>
+          <a:prstGeom prst="rect">
+            <a:avLst/>
+          </a:prstGeom>
+          <a:ln w="0">
+            <a:noFill/>
+          </a:ln>
+        </p:spPr>
+      </p:sp>
+      <p:sp>
+        <p:nvSpPr>
+          <p:cNvPr id="181" name="PlaceHolder 2"/>
           <p:cNvSpPr>
             <a:spLocks noGrp="1"/>
           </p:cNvSpPr>
@@ -961,18 +949,18 @@
         <p:spPr>
           <a:xfrm>
             <a:off x="685800" y="4400640"/>
-            <a:ext cx="5486040" cy="3600000"/>
-          </a:xfrm>
-          <a:prstGeom prst="rect">
-            <a:avLst/>
-          </a:prstGeom>
-          <a:noFill/>
-          <a:ln w="0">
-            <a:noFill/>
-          </a:ln>
-        </p:spPr>
-        <p:txBody>
-          <a:bodyPr anchor="t">
+            <a:ext cx="5485680" cy="3599640"/>
+          </a:xfrm>
+          <a:prstGeom prst="rect">
+            <a:avLst/>
+          </a:prstGeom>
+          <a:noFill/>
+          <a:ln w="0">
+            <a:noFill/>
+          </a:ln>
+        </p:spPr>
+        <p:txBody>
+          <a:bodyPr lIns="0" rIns="0" tIns="0" bIns="0" anchor="t">
             <a:noAutofit/>
           </a:bodyPr>
           <a:p>
@@ -984,7 +972,7 @@
       </p:sp>
       <p:sp>
         <p:nvSpPr>
-          <p:cNvPr id="184" name="PlaceHolder 3"/>
+          <p:cNvPr id="182" name="PlaceHolder 3"/>
           <p:cNvSpPr>
             <a:spLocks noGrp="1"/>
           </p:cNvSpPr>
@@ -995,18 +983,18 @@
         <p:spPr>
           <a:xfrm>
             <a:off x="3884760" y="8685360"/>
-            <a:ext cx="2971440" cy="458280"/>
-          </a:xfrm>
-          <a:prstGeom prst="rect">
-            <a:avLst/>
-          </a:prstGeom>
-          <a:noFill/>
-          <a:ln w="0">
-            <a:noFill/>
-          </a:ln>
-        </p:spPr>
-        <p:txBody>
-          <a:bodyPr anchor="b">
+            <a:ext cx="2971080" cy="457920"/>
+          </a:xfrm>
+          <a:prstGeom prst="rect">
+            <a:avLst/>
+          </a:prstGeom>
+          <a:noFill/>
+          <a:ln w="0">
+            <a:noFill/>
+          </a:ln>
+        </p:spPr>
+        <p:txBody>
+          <a:bodyPr lIns="0" rIns="0" tIns="0" bIns="0" anchor="b">
             <a:noAutofit/>
           </a:bodyPr>
           <a:lstStyle>
@@ -1031,7 +1019,7 @@
               </a:lnSpc>
               <a:buNone/>
             </a:pPr>
-            <a:fld id="{39ED2627-B941-47A5-B413-60A5126ADD30}" type="slidenum">
+            <a:fld id="{974D078A-19CC-46A7-A4D2-FF75D6F7092F}" type="slidenum">
               <a:rPr b="0" lang="en-US" sz="1200" spc="-1" strike="noStrike">
                 <a:solidFill>
                   <a:srgbClr val="000000"/>
@@ -1071,7 +1059,7 @@
       </p:grpSpPr>
       <p:sp>
         <p:nvSpPr>
-          <p:cNvPr id="185" name="PlaceHolder 1"/>
+          <p:cNvPr id="183" name="PlaceHolder 1"/>
           <p:cNvSpPr>
             <a:spLocks noGrp="1"/>
           </p:cNvSpPr>
@@ -1082,19 +1070,19 @@
         <p:spPr>
           <a:xfrm>
             <a:off x="685800" y="1143000"/>
-            <a:ext cx="5486040" cy="3085920"/>
-          </a:xfrm>
-          <a:prstGeom prst="rect">
-            <a:avLst/>
-          </a:prstGeom>
-          <a:ln w="0">
-            <a:noFill/>
-          </a:ln>
-        </p:spPr>
-      </p:sp>
-      <p:sp>
-        <p:nvSpPr>
-          <p:cNvPr id="186" name="PlaceHolder 2"/>
+            <a:ext cx="5485680" cy="3085560"/>
+          </a:xfrm>
+          <a:prstGeom prst="rect">
+            <a:avLst/>
+          </a:prstGeom>
+          <a:ln w="0">
+            <a:noFill/>
+          </a:ln>
+        </p:spPr>
+      </p:sp>
+      <p:sp>
+        <p:nvSpPr>
+          <p:cNvPr id="184" name="PlaceHolder 2"/>
           <p:cNvSpPr>
             <a:spLocks noGrp="1"/>
           </p:cNvSpPr>
@@ -1105,18 +1093,18 @@
         <p:spPr>
           <a:xfrm>
             <a:off x="685800" y="4400640"/>
-            <a:ext cx="5486040" cy="3600000"/>
-          </a:xfrm>
-          <a:prstGeom prst="rect">
-            <a:avLst/>
-          </a:prstGeom>
-          <a:noFill/>
-          <a:ln w="0">
-            <a:noFill/>
-          </a:ln>
-        </p:spPr>
-        <p:txBody>
-          <a:bodyPr anchor="t">
+            <a:ext cx="5485680" cy="3599640"/>
+          </a:xfrm>
+          <a:prstGeom prst="rect">
+            <a:avLst/>
+          </a:prstGeom>
+          <a:noFill/>
+          <a:ln w="0">
+            <a:noFill/>
+          </a:ln>
+        </p:spPr>
+        <p:txBody>
+          <a:bodyPr lIns="0" rIns="0" tIns="0" bIns="0" anchor="t">
             <a:noAutofit/>
           </a:bodyPr>
           <a:p>
@@ -1128,7 +1116,7 @@
       </p:sp>
       <p:sp>
         <p:nvSpPr>
-          <p:cNvPr id="187" name="PlaceHolder 3"/>
+          <p:cNvPr id="185" name="PlaceHolder 3"/>
           <p:cNvSpPr>
             <a:spLocks noGrp="1"/>
           </p:cNvSpPr>
@@ -1139,18 +1127,18 @@
         <p:spPr>
           <a:xfrm>
             <a:off x="3884760" y="8685360"/>
-            <a:ext cx="2971440" cy="458280"/>
-          </a:xfrm>
-          <a:prstGeom prst="rect">
-            <a:avLst/>
-          </a:prstGeom>
-          <a:noFill/>
-          <a:ln w="0">
-            <a:noFill/>
-          </a:ln>
-        </p:spPr>
-        <p:txBody>
-          <a:bodyPr anchor="b">
+            <a:ext cx="2971080" cy="457920"/>
+          </a:xfrm>
+          <a:prstGeom prst="rect">
+            <a:avLst/>
+          </a:prstGeom>
+          <a:noFill/>
+          <a:ln w="0">
+            <a:noFill/>
+          </a:ln>
+        </p:spPr>
+        <p:txBody>
+          <a:bodyPr lIns="0" rIns="0" tIns="0" bIns="0" anchor="b">
             <a:noAutofit/>
           </a:bodyPr>
           <a:lstStyle>
@@ -1175,7 +1163,7 @@
               </a:lnSpc>
               <a:buNone/>
             </a:pPr>
-            <a:fld id="{52A1C485-BD68-4517-A1FB-1B84A403FA89}" type="slidenum">
+            <a:fld id="{A29C7B87-BCDC-49DF-AE8B-881CAA76A7BC}" type="slidenum">
               <a:rPr b="0" lang="en-US" sz="1200" spc="-1" strike="noStrike">
                 <a:solidFill>
                   <a:srgbClr val="000000"/>
@@ -1215,7 +1203,7 @@
       </p:grpSpPr>
       <p:sp>
         <p:nvSpPr>
-          <p:cNvPr id="188" name="PlaceHolder 1"/>
+          <p:cNvPr id="186" name="PlaceHolder 1"/>
           <p:cNvSpPr>
             <a:spLocks noGrp="1"/>
           </p:cNvSpPr>
@@ -1226,19 +1214,19 @@
         <p:spPr>
           <a:xfrm>
             <a:off x="685800" y="1143000"/>
-            <a:ext cx="5486040" cy="3085920"/>
-          </a:xfrm>
-          <a:prstGeom prst="rect">
-            <a:avLst/>
-          </a:prstGeom>
-          <a:ln w="0">
-            <a:noFill/>
-          </a:ln>
-        </p:spPr>
-      </p:sp>
-      <p:sp>
-        <p:nvSpPr>
-          <p:cNvPr id="189" name="PlaceHolder 2"/>
+            <a:ext cx="5485680" cy="3085560"/>
+          </a:xfrm>
+          <a:prstGeom prst="rect">
+            <a:avLst/>
+          </a:prstGeom>
+          <a:ln w="0">
+            <a:noFill/>
+          </a:ln>
+        </p:spPr>
+      </p:sp>
+      <p:sp>
+        <p:nvSpPr>
+          <p:cNvPr id="187" name="PlaceHolder 2"/>
           <p:cNvSpPr>
             <a:spLocks noGrp="1"/>
           </p:cNvSpPr>
@@ -1249,18 +1237,18 @@
         <p:spPr>
           <a:xfrm>
             <a:off x="685800" y="4400640"/>
-            <a:ext cx="5486040" cy="3600000"/>
-          </a:xfrm>
-          <a:prstGeom prst="rect">
-            <a:avLst/>
-          </a:prstGeom>
-          <a:noFill/>
-          <a:ln w="0">
-            <a:noFill/>
-          </a:ln>
-        </p:spPr>
-        <p:txBody>
-          <a:bodyPr anchor="t">
+            <a:ext cx="5485680" cy="3599640"/>
+          </a:xfrm>
+          <a:prstGeom prst="rect">
+            <a:avLst/>
+          </a:prstGeom>
+          <a:noFill/>
+          <a:ln w="0">
+            <a:noFill/>
+          </a:ln>
+        </p:spPr>
+        <p:txBody>
+          <a:bodyPr lIns="0" rIns="0" tIns="0" bIns="0" anchor="t">
             <a:noAutofit/>
           </a:bodyPr>
           <a:p>
@@ -1272,7 +1260,7 @@
       </p:sp>
       <p:sp>
         <p:nvSpPr>
-          <p:cNvPr id="190" name="PlaceHolder 3"/>
+          <p:cNvPr id="188" name="PlaceHolder 3"/>
           <p:cNvSpPr>
             <a:spLocks noGrp="1"/>
           </p:cNvSpPr>
@@ -1283,18 +1271,18 @@
         <p:spPr>
           <a:xfrm>
             <a:off x="3884760" y="8685360"/>
-            <a:ext cx="2971440" cy="458280"/>
-          </a:xfrm>
-          <a:prstGeom prst="rect">
-            <a:avLst/>
-          </a:prstGeom>
-          <a:noFill/>
-          <a:ln w="0">
-            <a:noFill/>
-          </a:ln>
-        </p:spPr>
-        <p:txBody>
-          <a:bodyPr anchor="b">
+            <a:ext cx="2971080" cy="457920"/>
+          </a:xfrm>
+          <a:prstGeom prst="rect">
+            <a:avLst/>
+          </a:prstGeom>
+          <a:noFill/>
+          <a:ln w="0">
+            <a:noFill/>
+          </a:ln>
+        </p:spPr>
+        <p:txBody>
+          <a:bodyPr lIns="0" rIns="0" tIns="0" bIns="0" anchor="b">
             <a:noAutofit/>
           </a:bodyPr>
           <a:lstStyle>
@@ -1319,7 +1307,7 @@
               </a:lnSpc>
               <a:buNone/>
             </a:pPr>
-            <a:fld id="{0395E2D7-38E7-4A2E-9708-485962E54902}" type="slidenum">
+            <a:fld id="{D929B3FD-CDC8-4C1F-B5AD-97464B8EC85F}" type="slidenum">
               <a:rPr b="0" lang="en-US" sz="1200" spc="-1" strike="noStrike">
                 <a:solidFill>
                   <a:srgbClr val="000000"/>
@@ -1359,7 +1347,7 @@
       </p:grpSpPr>
       <p:sp>
         <p:nvSpPr>
-          <p:cNvPr id="191" name="PlaceHolder 1"/>
+          <p:cNvPr id="189" name="PlaceHolder 1"/>
           <p:cNvSpPr>
             <a:spLocks noGrp="1"/>
           </p:cNvSpPr>
@@ -1370,19 +1358,19 @@
         <p:spPr>
           <a:xfrm>
             <a:off x="685800" y="1143000"/>
-            <a:ext cx="5486040" cy="3085920"/>
-          </a:xfrm>
-          <a:prstGeom prst="rect">
-            <a:avLst/>
-          </a:prstGeom>
-          <a:ln w="0">
-            <a:noFill/>
-          </a:ln>
-        </p:spPr>
-      </p:sp>
-      <p:sp>
-        <p:nvSpPr>
-          <p:cNvPr id="192" name="PlaceHolder 2"/>
+            <a:ext cx="5485680" cy="3085560"/>
+          </a:xfrm>
+          <a:prstGeom prst="rect">
+            <a:avLst/>
+          </a:prstGeom>
+          <a:ln w="0">
+            <a:noFill/>
+          </a:ln>
+        </p:spPr>
+      </p:sp>
+      <p:sp>
+        <p:nvSpPr>
+          <p:cNvPr id="190" name="PlaceHolder 2"/>
           <p:cNvSpPr>
             <a:spLocks noGrp="1"/>
           </p:cNvSpPr>
@@ -1393,18 +1381,18 @@
         <p:spPr>
           <a:xfrm>
             <a:off x="685800" y="4400640"/>
-            <a:ext cx="5486040" cy="3600000"/>
-          </a:xfrm>
-          <a:prstGeom prst="rect">
-            <a:avLst/>
-          </a:prstGeom>
-          <a:noFill/>
-          <a:ln w="0">
-            <a:noFill/>
-          </a:ln>
-        </p:spPr>
-        <p:txBody>
-          <a:bodyPr anchor="t">
+            <a:ext cx="5485680" cy="3599640"/>
+          </a:xfrm>
+          <a:prstGeom prst="rect">
+            <a:avLst/>
+          </a:prstGeom>
+          <a:noFill/>
+          <a:ln w="0">
+            <a:noFill/>
+          </a:ln>
+        </p:spPr>
+        <p:txBody>
+          <a:bodyPr lIns="0" rIns="0" tIns="0" bIns="0" anchor="t">
             <a:noAutofit/>
           </a:bodyPr>
           <a:p>
@@ -1416,7 +1404,7 @@
       </p:sp>
       <p:sp>
         <p:nvSpPr>
-          <p:cNvPr id="193" name="PlaceHolder 3"/>
+          <p:cNvPr id="191" name="PlaceHolder 3"/>
           <p:cNvSpPr>
             <a:spLocks noGrp="1"/>
           </p:cNvSpPr>
@@ -1427,18 +1415,18 @@
         <p:spPr>
           <a:xfrm>
             <a:off x="3884760" y="8685360"/>
-            <a:ext cx="2971440" cy="458280"/>
-          </a:xfrm>
-          <a:prstGeom prst="rect">
-            <a:avLst/>
-          </a:prstGeom>
-          <a:noFill/>
-          <a:ln w="0">
-            <a:noFill/>
-          </a:ln>
-        </p:spPr>
-        <p:txBody>
-          <a:bodyPr anchor="b">
+            <a:ext cx="2971080" cy="457920"/>
+          </a:xfrm>
+          <a:prstGeom prst="rect">
+            <a:avLst/>
+          </a:prstGeom>
+          <a:noFill/>
+          <a:ln w="0">
+            <a:noFill/>
+          </a:ln>
+        </p:spPr>
+        <p:txBody>
+          <a:bodyPr lIns="0" rIns="0" tIns="0" bIns="0" anchor="b">
             <a:noAutofit/>
           </a:bodyPr>
           <a:lstStyle>
@@ -1463,7 +1451,7 @@
               </a:lnSpc>
               <a:buNone/>
             </a:pPr>
-            <a:fld id="{2CCFB6F0-B583-4F54-9EE4-0606E8A9DC2F}" type="slidenum">
+            <a:fld id="{993106D4-A5BD-449C-B398-0E96C5007499}" type="slidenum">
               <a:rPr b="0" lang="en-US" sz="1200" spc="-1" strike="noStrike">
                 <a:solidFill>
                   <a:srgbClr val="000000"/>
@@ -1503,7 +1491,7 @@
       </p:grpSpPr>
       <p:sp>
         <p:nvSpPr>
-          <p:cNvPr id="194" name="PlaceHolder 1"/>
+          <p:cNvPr id="192" name="PlaceHolder 1"/>
           <p:cNvSpPr>
             <a:spLocks noGrp="1"/>
           </p:cNvSpPr>
@@ -1514,19 +1502,19 @@
         <p:spPr>
           <a:xfrm>
             <a:off x="685800" y="1143000"/>
-            <a:ext cx="5486040" cy="3085920"/>
-          </a:xfrm>
-          <a:prstGeom prst="rect">
-            <a:avLst/>
-          </a:prstGeom>
-          <a:ln w="0">
-            <a:noFill/>
-          </a:ln>
-        </p:spPr>
-      </p:sp>
-      <p:sp>
-        <p:nvSpPr>
-          <p:cNvPr id="195" name="PlaceHolder 2"/>
+            <a:ext cx="5485680" cy="3085560"/>
+          </a:xfrm>
+          <a:prstGeom prst="rect">
+            <a:avLst/>
+          </a:prstGeom>
+          <a:ln w="0">
+            <a:noFill/>
+          </a:ln>
+        </p:spPr>
+      </p:sp>
+      <p:sp>
+        <p:nvSpPr>
+          <p:cNvPr id="193" name="PlaceHolder 2"/>
           <p:cNvSpPr>
             <a:spLocks noGrp="1"/>
           </p:cNvSpPr>
@@ -1537,18 +1525,18 @@
         <p:spPr>
           <a:xfrm>
             <a:off x="685800" y="4400640"/>
-            <a:ext cx="5486040" cy="3600000"/>
-          </a:xfrm>
-          <a:prstGeom prst="rect">
-            <a:avLst/>
-          </a:prstGeom>
-          <a:noFill/>
-          <a:ln w="0">
-            <a:noFill/>
-          </a:ln>
-        </p:spPr>
-        <p:txBody>
-          <a:bodyPr anchor="t">
+            <a:ext cx="5485680" cy="3599640"/>
+          </a:xfrm>
+          <a:prstGeom prst="rect">
+            <a:avLst/>
+          </a:prstGeom>
+          <a:noFill/>
+          <a:ln w="0">
+            <a:noFill/>
+          </a:ln>
+        </p:spPr>
+        <p:txBody>
+          <a:bodyPr lIns="0" rIns="0" tIns="0" bIns="0" anchor="t">
             <a:noAutofit/>
           </a:bodyPr>
           <a:p>
@@ -1560,7 +1548,7 @@
       </p:sp>
       <p:sp>
         <p:nvSpPr>
-          <p:cNvPr id="196" name="PlaceHolder 3"/>
+          <p:cNvPr id="194" name="PlaceHolder 3"/>
           <p:cNvSpPr>
             <a:spLocks noGrp="1"/>
           </p:cNvSpPr>
@@ -1571,18 +1559,18 @@
         <p:spPr>
           <a:xfrm>
             <a:off x="3884760" y="8685360"/>
-            <a:ext cx="2971440" cy="458280"/>
-          </a:xfrm>
-          <a:prstGeom prst="rect">
-            <a:avLst/>
-          </a:prstGeom>
-          <a:noFill/>
-          <a:ln w="0">
-            <a:noFill/>
-          </a:ln>
-        </p:spPr>
-        <p:txBody>
-          <a:bodyPr anchor="b">
+            <a:ext cx="2971080" cy="457920"/>
+          </a:xfrm>
+          <a:prstGeom prst="rect">
+            <a:avLst/>
+          </a:prstGeom>
+          <a:noFill/>
+          <a:ln w="0">
+            <a:noFill/>
+          </a:ln>
+        </p:spPr>
+        <p:txBody>
+          <a:bodyPr lIns="0" rIns="0" tIns="0" bIns="0" anchor="b">
             <a:noAutofit/>
           </a:bodyPr>
           <a:lstStyle>
@@ -1607,7 +1595,7 @@
               </a:lnSpc>
               <a:buNone/>
             </a:pPr>
-            <a:fld id="{F858EC12-4AF9-4332-B7D3-8BF9927DB721}" type="slidenum">
+            <a:fld id="{0CFFF3BC-2E33-4532-9B2C-EF7B0692E314}" type="slidenum">
               <a:rPr b="0" lang="en-US" sz="1200" spc="-1" strike="noStrike">
                 <a:solidFill>
                   <a:srgbClr val="000000"/>
@@ -1647,7 +1635,7 @@
       </p:grpSpPr>
       <p:sp>
         <p:nvSpPr>
-          <p:cNvPr id="197" name="PlaceHolder 1"/>
+          <p:cNvPr id="195" name="PlaceHolder 1"/>
           <p:cNvSpPr>
             <a:spLocks noGrp="1"/>
           </p:cNvSpPr>
@@ -1658,19 +1646,19 @@
         <p:spPr>
           <a:xfrm>
             <a:off x="685800" y="1143000"/>
-            <a:ext cx="5486040" cy="3085920"/>
-          </a:xfrm>
-          <a:prstGeom prst="rect">
-            <a:avLst/>
-          </a:prstGeom>
-          <a:ln w="0">
-            <a:noFill/>
-          </a:ln>
-        </p:spPr>
-      </p:sp>
-      <p:sp>
-        <p:nvSpPr>
-          <p:cNvPr id="198" name="PlaceHolder 2"/>
+            <a:ext cx="5485680" cy="3085560"/>
+          </a:xfrm>
+          <a:prstGeom prst="rect">
+            <a:avLst/>
+          </a:prstGeom>
+          <a:ln w="0">
+            <a:noFill/>
+          </a:ln>
+        </p:spPr>
+      </p:sp>
+      <p:sp>
+        <p:nvSpPr>
+          <p:cNvPr id="196" name="PlaceHolder 2"/>
           <p:cNvSpPr>
             <a:spLocks noGrp="1"/>
           </p:cNvSpPr>
@@ -1681,18 +1669,18 @@
         <p:spPr>
           <a:xfrm>
             <a:off x="685800" y="4400640"/>
-            <a:ext cx="5486040" cy="3600000"/>
-          </a:xfrm>
-          <a:prstGeom prst="rect">
-            <a:avLst/>
-          </a:prstGeom>
-          <a:noFill/>
-          <a:ln w="0">
-            <a:noFill/>
-          </a:ln>
-        </p:spPr>
-        <p:txBody>
-          <a:bodyPr anchor="t">
+            <a:ext cx="5485680" cy="3599640"/>
+          </a:xfrm>
+          <a:prstGeom prst="rect">
+            <a:avLst/>
+          </a:prstGeom>
+          <a:noFill/>
+          <a:ln w="0">
+            <a:noFill/>
+          </a:ln>
+        </p:spPr>
+        <p:txBody>
+          <a:bodyPr lIns="0" rIns="0" tIns="0" bIns="0" anchor="t">
             <a:noAutofit/>
           </a:bodyPr>
           <a:p>
@@ -1704,7 +1692,7 @@
       </p:sp>
       <p:sp>
         <p:nvSpPr>
-          <p:cNvPr id="199" name="PlaceHolder 3"/>
+          <p:cNvPr id="197" name="PlaceHolder 3"/>
           <p:cNvSpPr>
             <a:spLocks noGrp="1"/>
           </p:cNvSpPr>
@@ -1715,18 +1703,18 @@
         <p:spPr>
           <a:xfrm>
             <a:off x="3884760" y="8685360"/>
-            <a:ext cx="2971440" cy="458280"/>
-          </a:xfrm>
-          <a:prstGeom prst="rect">
-            <a:avLst/>
-          </a:prstGeom>
-          <a:noFill/>
-          <a:ln w="0">
-            <a:noFill/>
-          </a:ln>
-        </p:spPr>
-        <p:txBody>
-          <a:bodyPr anchor="b">
+            <a:ext cx="2971080" cy="457920"/>
+          </a:xfrm>
+          <a:prstGeom prst="rect">
+            <a:avLst/>
+          </a:prstGeom>
+          <a:noFill/>
+          <a:ln w="0">
+            <a:noFill/>
+          </a:ln>
+        </p:spPr>
+        <p:txBody>
+          <a:bodyPr lIns="0" rIns="0" tIns="0" bIns="0" anchor="b">
             <a:noAutofit/>
           </a:bodyPr>
           <a:lstStyle>
@@ -1751,7 +1739,7 @@
               </a:lnSpc>
               <a:buNone/>
             </a:pPr>
-            <a:fld id="{E3EE71D5-8CF3-4D59-9E7F-F616486B04D2}" type="slidenum">
+            <a:fld id="{79DD33DC-2FFB-42C2-A651-E7C568C98B98}" type="slidenum">
               <a:rPr b="0" lang="en-US" sz="1200" spc="-1" strike="noStrike">
                 <a:solidFill>
                   <a:srgbClr val="000000"/>
@@ -1791,7 +1779,7 @@
       </p:grpSpPr>
       <p:sp>
         <p:nvSpPr>
-          <p:cNvPr id="200" name="PlaceHolder 1"/>
+          <p:cNvPr id="198" name="PlaceHolder 1"/>
           <p:cNvSpPr>
             <a:spLocks noGrp="1"/>
           </p:cNvSpPr>
@@ -1802,19 +1790,19 @@
         <p:spPr>
           <a:xfrm>
             <a:off x="685800" y="1143000"/>
-            <a:ext cx="5486040" cy="3085920"/>
-          </a:xfrm>
-          <a:prstGeom prst="rect">
-            <a:avLst/>
-          </a:prstGeom>
-          <a:ln w="0">
-            <a:noFill/>
-          </a:ln>
-        </p:spPr>
-      </p:sp>
-      <p:sp>
-        <p:nvSpPr>
-          <p:cNvPr id="201" name="PlaceHolder 2"/>
+            <a:ext cx="5485680" cy="3085560"/>
+          </a:xfrm>
+          <a:prstGeom prst="rect">
+            <a:avLst/>
+          </a:prstGeom>
+          <a:ln w="0">
+            <a:noFill/>
+          </a:ln>
+        </p:spPr>
+      </p:sp>
+      <p:sp>
+        <p:nvSpPr>
+          <p:cNvPr id="199" name="PlaceHolder 2"/>
           <p:cNvSpPr>
             <a:spLocks noGrp="1"/>
           </p:cNvSpPr>
@@ -1825,18 +1813,18 @@
         <p:spPr>
           <a:xfrm>
             <a:off x="685800" y="4400640"/>
-            <a:ext cx="5486040" cy="3600000"/>
-          </a:xfrm>
-          <a:prstGeom prst="rect">
-            <a:avLst/>
-          </a:prstGeom>
-          <a:noFill/>
-          <a:ln w="0">
-            <a:noFill/>
-          </a:ln>
-        </p:spPr>
-        <p:txBody>
-          <a:bodyPr anchor="t">
+            <a:ext cx="5485680" cy="3599640"/>
+          </a:xfrm>
+          <a:prstGeom prst="rect">
+            <a:avLst/>
+          </a:prstGeom>
+          <a:noFill/>
+          <a:ln w="0">
+            <a:noFill/>
+          </a:ln>
+        </p:spPr>
+        <p:txBody>
+          <a:bodyPr lIns="0" rIns="0" tIns="0" bIns="0" anchor="t">
             <a:noAutofit/>
           </a:bodyPr>
           <a:p>
@@ -1848,7 +1836,7 @@
       </p:sp>
       <p:sp>
         <p:nvSpPr>
-          <p:cNvPr id="202" name="PlaceHolder 3"/>
+          <p:cNvPr id="200" name="PlaceHolder 3"/>
           <p:cNvSpPr>
             <a:spLocks noGrp="1"/>
           </p:cNvSpPr>
@@ -1859,18 +1847,18 @@
         <p:spPr>
           <a:xfrm>
             <a:off x="3884760" y="8685360"/>
-            <a:ext cx="2971440" cy="458280"/>
-          </a:xfrm>
-          <a:prstGeom prst="rect">
-            <a:avLst/>
-          </a:prstGeom>
-          <a:noFill/>
-          <a:ln w="0">
-            <a:noFill/>
-          </a:ln>
-        </p:spPr>
-        <p:txBody>
-          <a:bodyPr anchor="b">
+            <a:ext cx="2971080" cy="457920"/>
+          </a:xfrm>
+          <a:prstGeom prst="rect">
+            <a:avLst/>
+          </a:prstGeom>
+          <a:noFill/>
+          <a:ln w="0">
+            <a:noFill/>
+          </a:ln>
+        </p:spPr>
+        <p:txBody>
+          <a:bodyPr lIns="0" rIns="0" tIns="0" bIns="0" anchor="b">
             <a:noAutofit/>
           </a:bodyPr>
           <a:lstStyle>
@@ -1895,7 +1883,7 @@
               </a:lnSpc>
               <a:buNone/>
             </a:pPr>
-            <a:fld id="{AB4DFAD8-F792-4D41-82AF-198574C9A690}" type="slidenum">
+            <a:fld id="{EEF7B6A2-414B-4E1E-ACA2-288B0EE68354}" type="slidenum">
               <a:rPr b="0" lang="en-US" sz="1200" spc="-1" strike="noStrike">
                 <a:solidFill>
                   <a:srgbClr val="000000"/>
@@ -1983,11 +1971,11 @@
             <a:noAutofit/>
           </a:bodyPr>
           <a:p>
-            <a:endParaRPr b="0" lang="en-IN" sz="1800" spc="-1" strike="noStrike">
-              <a:solidFill>
-                <a:srgbClr val="000000"/>
-              </a:solidFill>
-              <a:latin typeface="Calibri"/>
+            <a:pPr algn="ctr">
+              <a:buNone/>
+            </a:pPr>
+            <a:endParaRPr b="0" lang="en-IN" sz="4400" spc="-1" strike="noStrike">
+              <a:latin typeface="Arial"/>
             </a:endParaRPr>
           </a:p>
         </p:txBody>
@@ -2021,10 +2009,7 @@
           </a:bodyPr>
           <a:p>
             <a:endParaRPr b="0" lang="en-IN" sz="3200" spc="-1" strike="noStrike">
-              <a:solidFill>
-                <a:srgbClr val="000000"/>
-              </a:solidFill>
-              <a:latin typeface="Calibri"/>
+              <a:latin typeface="Arial"/>
             </a:endParaRPr>
           </a:p>
         </p:txBody>
@@ -2058,10 +2043,7 @@
           </a:bodyPr>
           <a:p>
             <a:endParaRPr b="0" lang="en-IN" sz="3200" spc="-1" strike="noStrike">
-              <a:solidFill>
-                <a:srgbClr val="000000"/>
-              </a:solidFill>
-              <a:latin typeface="Calibri"/>
+              <a:latin typeface="Arial"/>
             </a:endParaRPr>
           </a:p>
         </p:txBody>
@@ -2116,11 +2098,11 @@
             <a:noAutofit/>
           </a:bodyPr>
           <a:p>
-            <a:endParaRPr b="0" lang="en-IN" sz="1800" spc="-1" strike="noStrike">
-              <a:solidFill>
-                <a:srgbClr val="000000"/>
-              </a:solidFill>
-              <a:latin typeface="Calibri"/>
+            <a:pPr algn="ctr">
+              <a:buNone/>
+            </a:pPr>
+            <a:endParaRPr b="0" lang="en-IN" sz="4400" spc="-1" strike="noStrike">
+              <a:latin typeface="Arial"/>
             </a:endParaRPr>
           </a:p>
         </p:txBody>
@@ -2154,10 +2136,7 @@
           </a:bodyPr>
           <a:p>
             <a:endParaRPr b="0" lang="en-IN" sz="3200" spc="-1" strike="noStrike">
-              <a:solidFill>
-                <a:srgbClr val="000000"/>
-              </a:solidFill>
-              <a:latin typeface="Calibri"/>
+              <a:latin typeface="Arial"/>
             </a:endParaRPr>
           </a:p>
         </p:txBody>
@@ -2191,10 +2170,7 @@
           </a:bodyPr>
           <a:p>
             <a:endParaRPr b="0" lang="en-IN" sz="3200" spc="-1" strike="noStrike">
-              <a:solidFill>
-                <a:srgbClr val="000000"/>
-              </a:solidFill>
-              <a:latin typeface="Calibri"/>
+              <a:latin typeface="Arial"/>
             </a:endParaRPr>
           </a:p>
         </p:txBody>
@@ -2228,10 +2204,7 @@
           </a:bodyPr>
           <a:p>
             <a:endParaRPr b="0" lang="en-IN" sz="3200" spc="-1" strike="noStrike">
-              <a:solidFill>
-                <a:srgbClr val="000000"/>
-              </a:solidFill>
-              <a:latin typeface="Calibri"/>
+              <a:latin typeface="Arial"/>
             </a:endParaRPr>
           </a:p>
         </p:txBody>
@@ -2265,10 +2238,7 @@
           </a:bodyPr>
           <a:p>
             <a:endParaRPr b="0" lang="en-IN" sz="3200" spc="-1" strike="noStrike">
-              <a:solidFill>
-                <a:srgbClr val="000000"/>
-              </a:solidFill>
-              <a:latin typeface="Calibri"/>
+              <a:latin typeface="Arial"/>
             </a:endParaRPr>
           </a:p>
         </p:txBody>
@@ -2323,11 +2293,11 @@
             <a:noAutofit/>
           </a:bodyPr>
           <a:p>
-            <a:endParaRPr b="0" lang="en-IN" sz="1800" spc="-1" strike="noStrike">
-              <a:solidFill>
-                <a:srgbClr val="000000"/>
-              </a:solidFill>
-              <a:latin typeface="Calibri"/>
+            <a:pPr algn="ctr">
+              <a:buNone/>
+            </a:pPr>
+            <a:endParaRPr b="0" lang="en-IN" sz="4400" spc="-1" strike="noStrike">
+              <a:latin typeface="Arial"/>
             </a:endParaRPr>
           </a:p>
         </p:txBody>
@@ -2361,10 +2331,7 @@
           </a:bodyPr>
           <a:p>
             <a:endParaRPr b="0" lang="en-IN" sz="3200" spc="-1" strike="noStrike">
-              <a:solidFill>
-                <a:srgbClr val="000000"/>
-              </a:solidFill>
-              <a:latin typeface="Calibri"/>
+              <a:latin typeface="Arial"/>
             </a:endParaRPr>
           </a:p>
         </p:txBody>
@@ -2398,10 +2365,7 @@
           </a:bodyPr>
           <a:p>
             <a:endParaRPr b="0" lang="en-IN" sz="3200" spc="-1" strike="noStrike">
-              <a:solidFill>
-                <a:srgbClr val="000000"/>
-              </a:solidFill>
-              <a:latin typeface="Calibri"/>
+              <a:latin typeface="Arial"/>
             </a:endParaRPr>
           </a:p>
         </p:txBody>
@@ -2435,10 +2399,7 @@
           </a:bodyPr>
           <a:p>
             <a:endParaRPr b="0" lang="en-IN" sz="3200" spc="-1" strike="noStrike">
-              <a:solidFill>
-                <a:srgbClr val="000000"/>
-              </a:solidFill>
-              <a:latin typeface="Calibri"/>
+              <a:latin typeface="Arial"/>
             </a:endParaRPr>
           </a:p>
         </p:txBody>
@@ -2472,10 +2433,7 @@
           </a:bodyPr>
           <a:p>
             <a:endParaRPr b="0" lang="en-IN" sz="3200" spc="-1" strike="noStrike">
-              <a:solidFill>
-                <a:srgbClr val="000000"/>
-              </a:solidFill>
-              <a:latin typeface="Calibri"/>
+              <a:latin typeface="Arial"/>
             </a:endParaRPr>
           </a:p>
         </p:txBody>
@@ -2509,10 +2467,7 @@
           </a:bodyPr>
           <a:p>
             <a:endParaRPr b="0" lang="en-IN" sz="3200" spc="-1" strike="noStrike">
-              <a:solidFill>
-                <a:srgbClr val="000000"/>
-              </a:solidFill>
-              <a:latin typeface="Calibri"/>
+              <a:latin typeface="Arial"/>
             </a:endParaRPr>
           </a:p>
         </p:txBody>
@@ -2546,10 +2501,7 @@
           </a:bodyPr>
           <a:p>
             <a:endParaRPr b="0" lang="en-IN" sz="3200" spc="-1" strike="noStrike">
-              <a:solidFill>
-                <a:srgbClr val="000000"/>
-              </a:solidFill>
-              <a:latin typeface="Calibri"/>
+              <a:latin typeface="Arial"/>
             </a:endParaRPr>
           </a:p>
         </p:txBody>
@@ -2604,11 +2556,11 @@
             <a:noAutofit/>
           </a:bodyPr>
           <a:p>
-            <a:endParaRPr b="0" lang="en-IN" sz="1800" spc="-1" strike="noStrike">
-              <a:solidFill>
-                <a:srgbClr val="000000"/>
-              </a:solidFill>
-              <a:latin typeface="Calibri"/>
+            <a:pPr algn="ctr">
+              <a:buNone/>
+            </a:pPr>
+            <a:endParaRPr b="0" lang="en-IN" sz="4400" spc="-1" strike="noStrike">
+              <a:latin typeface="Arial"/>
             </a:endParaRPr>
           </a:p>
         </p:txBody>
@@ -2700,11 +2652,11 @@
             <a:noAutofit/>
           </a:bodyPr>
           <a:p>
-            <a:endParaRPr b="0" lang="en-IN" sz="1800" spc="-1" strike="noStrike">
-              <a:solidFill>
-                <a:srgbClr val="000000"/>
-              </a:solidFill>
-              <a:latin typeface="Calibri"/>
+            <a:pPr algn="ctr">
+              <a:buNone/>
+            </a:pPr>
+            <a:endParaRPr b="0" lang="en-IN" sz="4400" spc="-1" strike="noStrike">
+              <a:latin typeface="Arial"/>
             </a:endParaRPr>
           </a:p>
         </p:txBody>
@@ -2738,10 +2690,7 @@
           </a:bodyPr>
           <a:p>
             <a:endParaRPr b="0" lang="en-IN" sz="3200" spc="-1" strike="noStrike">
-              <a:solidFill>
-                <a:srgbClr val="000000"/>
-              </a:solidFill>
-              <a:latin typeface="Calibri"/>
+              <a:latin typeface="Arial"/>
             </a:endParaRPr>
           </a:p>
         </p:txBody>
@@ -2796,11 +2745,11 @@
             <a:noAutofit/>
           </a:bodyPr>
           <a:p>
-            <a:endParaRPr b="0" lang="en-IN" sz="1800" spc="-1" strike="noStrike">
-              <a:solidFill>
-                <a:srgbClr val="000000"/>
-              </a:solidFill>
-              <a:latin typeface="Calibri"/>
+            <a:pPr algn="ctr">
+              <a:buNone/>
+            </a:pPr>
+            <a:endParaRPr b="0" lang="en-IN" sz="4400" spc="-1" strike="noStrike">
+              <a:latin typeface="Arial"/>
             </a:endParaRPr>
           </a:p>
         </p:txBody>
@@ -2834,10 +2783,7 @@
           </a:bodyPr>
           <a:p>
             <a:endParaRPr b="0" lang="en-IN" sz="3200" spc="-1" strike="noStrike">
-              <a:solidFill>
-                <a:srgbClr val="000000"/>
-              </a:solidFill>
-              <a:latin typeface="Calibri"/>
+              <a:latin typeface="Arial"/>
             </a:endParaRPr>
           </a:p>
         </p:txBody>
@@ -2871,10 +2817,7 @@
           </a:bodyPr>
           <a:p>
             <a:endParaRPr b="0" lang="en-IN" sz="3200" spc="-1" strike="noStrike">
-              <a:solidFill>
-                <a:srgbClr val="000000"/>
-              </a:solidFill>
-              <a:latin typeface="Calibri"/>
+              <a:latin typeface="Arial"/>
             </a:endParaRPr>
           </a:p>
         </p:txBody>
@@ -2929,11 +2872,11 @@
             <a:noAutofit/>
           </a:bodyPr>
           <a:p>
-            <a:endParaRPr b="0" lang="en-IN" sz="1800" spc="-1" strike="noStrike">
-              <a:solidFill>
-                <a:srgbClr val="000000"/>
-              </a:solidFill>
-              <a:latin typeface="Calibri"/>
+            <a:pPr algn="ctr">
+              <a:buNone/>
+            </a:pPr>
+            <a:endParaRPr b="0" lang="en-IN" sz="4400" spc="-1" strike="noStrike">
+              <a:latin typeface="Arial"/>
             </a:endParaRPr>
           </a:p>
         </p:txBody>
@@ -3047,11 +2990,11 @@
             <a:noAutofit/>
           </a:bodyPr>
           <a:p>
-            <a:endParaRPr b="0" lang="en-IN" sz="1800" spc="-1" strike="noStrike">
-              <a:solidFill>
-                <a:srgbClr val="000000"/>
-              </a:solidFill>
-              <a:latin typeface="Calibri"/>
+            <a:pPr algn="ctr">
+              <a:buNone/>
+            </a:pPr>
+            <a:endParaRPr b="0" lang="en-IN" sz="4400" spc="-1" strike="noStrike">
+              <a:latin typeface="Arial"/>
             </a:endParaRPr>
           </a:p>
         </p:txBody>
@@ -3085,10 +3028,7 @@
           </a:bodyPr>
           <a:p>
             <a:endParaRPr b="0" lang="en-IN" sz="3200" spc="-1" strike="noStrike">
-              <a:solidFill>
-                <a:srgbClr val="000000"/>
-              </a:solidFill>
-              <a:latin typeface="Calibri"/>
+              <a:latin typeface="Arial"/>
             </a:endParaRPr>
           </a:p>
         </p:txBody>
@@ -3122,10 +3062,7 @@
           </a:bodyPr>
           <a:p>
             <a:endParaRPr b="0" lang="en-IN" sz="3200" spc="-1" strike="noStrike">
-              <a:solidFill>
-                <a:srgbClr val="000000"/>
-              </a:solidFill>
-              <a:latin typeface="Calibri"/>
+              <a:latin typeface="Arial"/>
             </a:endParaRPr>
           </a:p>
         </p:txBody>
@@ -3159,10 +3096,7 @@
           </a:bodyPr>
           <a:p>
             <a:endParaRPr b="0" lang="en-IN" sz="3200" spc="-1" strike="noStrike">
-              <a:solidFill>
-                <a:srgbClr val="000000"/>
-              </a:solidFill>
-              <a:latin typeface="Calibri"/>
+              <a:latin typeface="Arial"/>
             </a:endParaRPr>
           </a:p>
         </p:txBody>
@@ -3217,11 +3151,11 @@
             <a:noAutofit/>
           </a:bodyPr>
           <a:p>
-            <a:endParaRPr b="0" lang="en-IN" sz="1800" spc="-1" strike="noStrike">
-              <a:solidFill>
-                <a:srgbClr val="000000"/>
-              </a:solidFill>
-              <a:latin typeface="Calibri"/>
+            <a:pPr algn="ctr">
+              <a:buNone/>
+            </a:pPr>
+            <a:endParaRPr b="0" lang="en-IN" sz="4400" spc="-1" strike="noStrike">
+              <a:latin typeface="Arial"/>
             </a:endParaRPr>
           </a:p>
         </p:txBody>
@@ -3255,10 +3189,7 @@
           </a:bodyPr>
           <a:p>
             <a:endParaRPr b="0" lang="en-IN" sz="3200" spc="-1" strike="noStrike">
-              <a:solidFill>
-                <a:srgbClr val="000000"/>
-              </a:solidFill>
-              <a:latin typeface="Calibri"/>
+              <a:latin typeface="Arial"/>
             </a:endParaRPr>
           </a:p>
         </p:txBody>
@@ -3292,10 +3223,7 @@
           </a:bodyPr>
           <a:p>
             <a:endParaRPr b="0" lang="en-IN" sz="3200" spc="-1" strike="noStrike">
-              <a:solidFill>
-                <a:srgbClr val="000000"/>
-              </a:solidFill>
-              <a:latin typeface="Calibri"/>
+              <a:latin typeface="Arial"/>
             </a:endParaRPr>
           </a:p>
         </p:txBody>
@@ -3329,10 +3257,7 @@
           </a:bodyPr>
           <a:p>
             <a:endParaRPr b="0" lang="en-IN" sz="3200" spc="-1" strike="noStrike">
-              <a:solidFill>
-                <a:srgbClr val="000000"/>
-              </a:solidFill>
-              <a:latin typeface="Calibri"/>
+              <a:latin typeface="Arial"/>
             </a:endParaRPr>
           </a:p>
         </p:txBody>
@@ -3387,11 +3312,11 @@
             <a:noAutofit/>
           </a:bodyPr>
           <a:p>
-            <a:endParaRPr b="0" lang="en-IN" sz="1800" spc="-1" strike="noStrike">
-              <a:solidFill>
-                <a:srgbClr val="000000"/>
-              </a:solidFill>
-              <a:latin typeface="Calibri"/>
+            <a:pPr algn="ctr">
+              <a:buNone/>
+            </a:pPr>
+            <a:endParaRPr b="0" lang="en-IN" sz="4400" spc="-1" strike="noStrike">
+              <a:latin typeface="Arial"/>
             </a:endParaRPr>
           </a:p>
         </p:txBody>
@@ -3425,10 +3350,7 @@
           </a:bodyPr>
           <a:p>
             <a:endParaRPr b="0" lang="en-IN" sz="3200" spc="-1" strike="noStrike">
-              <a:solidFill>
-                <a:srgbClr val="000000"/>
-              </a:solidFill>
-              <a:latin typeface="Calibri"/>
+              <a:latin typeface="Arial"/>
             </a:endParaRPr>
           </a:p>
         </p:txBody>
@@ -3462,10 +3384,7 @@
           </a:bodyPr>
           <a:p>
             <a:endParaRPr b="0" lang="en-IN" sz="3200" spc="-1" strike="noStrike">
-              <a:solidFill>
-                <a:srgbClr val="000000"/>
-              </a:solidFill>
-              <a:latin typeface="Calibri"/>
+              <a:latin typeface="Arial"/>
             </a:endParaRPr>
           </a:p>
         </p:txBody>
@@ -3499,10 +3418,7 @@
           </a:bodyPr>
           <a:p>
             <a:endParaRPr b="0" lang="en-IN" sz="3200" spc="-1" strike="noStrike">
-              <a:solidFill>
-                <a:srgbClr val="000000"/>
-              </a:solidFill>
-              <a:latin typeface="Calibri"/>
+              <a:latin typeface="Arial"/>
             </a:endParaRPr>
           </a:p>
         </p:txBody>
@@ -3564,29 +3480,23 @@
             <a:noAutofit/>
           </a:bodyPr>
           <a:p>
+            <a:pPr algn="ctr">
+              <a:buNone/>
+            </a:pPr>
             <a:r>
-              <a:rPr b="0" lang="en-IN" sz="1800" spc="-1" strike="noStrike">
-                <a:solidFill>
-                  <a:srgbClr val="000000"/>
-                </a:solidFill>
-                <a:latin typeface="Calibri"/>
+              <a:rPr b="0" lang="en-IN" sz="4400" spc="-1" strike="noStrike">
+                <a:latin typeface="Arial"/>
               </a:rPr>
               <a:t>Click to edit the title text </a:t>
             </a:r>
             <a:r>
-              <a:rPr b="0" lang="en-IN" sz="1800" spc="-1" strike="noStrike">
-                <a:solidFill>
-                  <a:srgbClr val="000000"/>
-                </a:solidFill>
-                <a:latin typeface="Calibri"/>
+              <a:rPr b="0" lang="en-IN" sz="4400" spc="-1" strike="noStrike">
+                <a:latin typeface="Arial"/>
               </a:rPr>
               <a:t>format</a:t>
             </a:r>
-            <a:endParaRPr b="0" lang="en-IN" sz="1800" spc="-1" strike="noStrike">
-              <a:solidFill>
-                <a:srgbClr val="000000"/>
-              </a:solidFill>
-              <a:latin typeface="Calibri"/>
+            <a:endParaRPr b="0" lang="en-IN" sz="4400" spc="-1" strike="noStrike">
+              <a:latin typeface="Arial"/>
             </a:endParaRPr>
           </a:p>
         </p:txBody>
@@ -3632,18 +3542,12 @@
             </a:pPr>
             <a:r>
               <a:rPr b="0" lang="en-IN" sz="3200" spc="-1" strike="noStrike">
-                <a:solidFill>
-                  <a:srgbClr val="000000"/>
-                </a:solidFill>
-                <a:latin typeface="Calibri"/>
+                <a:latin typeface="Arial"/>
               </a:rPr>
               <a:t>Click to edit the outline text format</a:t>
             </a:r>
             <a:endParaRPr b="0" lang="en-IN" sz="3200" spc="-1" strike="noStrike">
-              <a:solidFill>
-                <a:srgbClr val="000000"/>
-              </a:solidFill>
-              <a:latin typeface="Calibri"/>
+              <a:latin typeface="Arial"/>
             </a:endParaRPr>
           </a:p>
           <a:p>
@@ -3659,19 +3563,13 @@
               <a:buChar char=""/>
             </a:pPr>
             <a:r>
-              <a:rPr b="0" lang="en-IN" sz="2400" spc="-1" strike="noStrike">
-                <a:solidFill>
-                  <a:srgbClr val="000000"/>
-                </a:solidFill>
-                <a:latin typeface="Calibri"/>
+              <a:rPr b="0" lang="en-IN" sz="2800" spc="-1" strike="noStrike">
+                <a:latin typeface="Arial"/>
               </a:rPr>
               <a:t>Second Outline Level</a:t>
             </a:r>
-            <a:endParaRPr b="0" lang="en-IN" sz="2400" spc="-1" strike="noStrike">
-              <a:solidFill>
-                <a:srgbClr val="000000"/>
-              </a:solidFill>
-              <a:latin typeface="Calibri"/>
+            <a:endParaRPr b="0" lang="en-IN" sz="2800" spc="-1" strike="noStrike">
+              <a:latin typeface="Arial"/>
             </a:endParaRPr>
           </a:p>
           <a:p>
@@ -3687,19 +3585,13 @@
               <a:buChar char=""/>
             </a:pPr>
             <a:r>
-              <a:rPr b="0" lang="en-IN" sz="2000" spc="-1" strike="noStrike">
-                <a:solidFill>
-                  <a:srgbClr val="000000"/>
-                </a:solidFill>
-                <a:latin typeface="Calibri"/>
+              <a:rPr b="0" lang="en-IN" sz="2400" spc="-1" strike="noStrike">
+                <a:latin typeface="Arial"/>
               </a:rPr>
               <a:t>Third Outline Level</a:t>
             </a:r>
-            <a:endParaRPr b="0" lang="en-IN" sz="2000" spc="-1" strike="noStrike">
-              <a:solidFill>
-                <a:srgbClr val="000000"/>
-              </a:solidFill>
-              <a:latin typeface="Calibri"/>
+            <a:endParaRPr b="0" lang="en-IN" sz="2400" spc="-1" strike="noStrike">
+              <a:latin typeface="Arial"/>
             </a:endParaRPr>
           </a:p>
           <a:p>
@@ -3716,18 +3608,12 @@
             </a:pPr>
             <a:r>
               <a:rPr b="0" lang="en-IN" sz="2000" spc="-1" strike="noStrike">
-                <a:solidFill>
-                  <a:srgbClr val="000000"/>
-                </a:solidFill>
-                <a:latin typeface="Calibri"/>
+                <a:latin typeface="Arial"/>
               </a:rPr>
               <a:t>Fourth Outline Level</a:t>
             </a:r>
             <a:endParaRPr b="0" lang="en-IN" sz="2000" spc="-1" strike="noStrike">
-              <a:solidFill>
-                <a:srgbClr val="000000"/>
-              </a:solidFill>
-              <a:latin typeface="Calibri"/>
+              <a:latin typeface="Arial"/>
             </a:endParaRPr>
           </a:p>
           <a:p>
@@ -3744,18 +3630,12 @@
             </a:pPr>
             <a:r>
               <a:rPr b="0" lang="en-IN" sz="2000" spc="-1" strike="noStrike">
-                <a:solidFill>
-                  <a:srgbClr val="000000"/>
-                </a:solidFill>
-                <a:latin typeface="Calibri"/>
+                <a:latin typeface="Arial"/>
               </a:rPr>
               <a:t>Fifth Outline Level</a:t>
             </a:r>
             <a:endParaRPr b="0" lang="en-IN" sz="2000" spc="-1" strike="noStrike">
-              <a:solidFill>
-                <a:srgbClr val="000000"/>
-              </a:solidFill>
-              <a:latin typeface="Calibri"/>
+              <a:latin typeface="Arial"/>
             </a:endParaRPr>
           </a:p>
           <a:p>
@@ -3772,18 +3652,12 @@
             </a:pPr>
             <a:r>
               <a:rPr b="0" lang="en-IN" sz="2000" spc="-1" strike="noStrike">
-                <a:solidFill>
-                  <a:srgbClr val="000000"/>
-                </a:solidFill>
-                <a:latin typeface="Calibri"/>
+                <a:latin typeface="Arial"/>
               </a:rPr>
               <a:t>Sixth Outline Level</a:t>
             </a:r>
             <a:endParaRPr b="0" lang="en-IN" sz="2000" spc="-1" strike="noStrike">
-              <a:solidFill>
-                <a:srgbClr val="000000"/>
-              </a:solidFill>
-              <a:latin typeface="Calibri"/>
+              <a:latin typeface="Arial"/>
             </a:endParaRPr>
           </a:p>
           <a:p>
@@ -3800,18 +3674,12 @@
             </a:pPr>
             <a:r>
               <a:rPr b="0" lang="en-IN" sz="2000" spc="-1" strike="noStrike">
-                <a:solidFill>
-                  <a:srgbClr val="000000"/>
-                </a:solidFill>
-                <a:latin typeface="Calibri"/>
+                <a:latin typeface="Arial"/>
               </a:rPr>
               <a:t>Seventh Outline Level</a:t>
             </a:r>
             <a:endParaRPr b="0" lang="en-IN" sz="2000" spc="-1" strike="noStrike">
-              <a:solidFill>
-                <a:srgbClr val="000000"/>
-              </a:solidFill>
-              <a:latin typeface="Calibri"/>
+              <a:latin typeface="Arial"/>
             </a:endParaRPr>
           </a:p>
         </p:txBody>
@@ -3866,7 +3734,7 @@
         <p:spPr>
           <a:xfrm>
             <a:off x="0" y="0"/>
-            <a:ext cx="14630040" cy="8229240"/>
+            <a:ext cx="14629680" cy="8228880"/>
           </a:xfrm>
           <a:prstGeom prst="rect">
             <a:avLst/>
@@ -3885,7 +3753,7 @@
         <p:spPr>
           <a:xfrm>
             <a:off x="0" y="0"/>
-            <a:ext cx="14630040" cy="8229960"/>
+            <a:ext cx="14629680" cy="8229600"/>
           </a:xfrm>
           <a:prstGeom prst="rect">
             <a:avLst/>
@@ -3919,7 +3787,7 @@
         <p:spPr>
           <a:xfrm>
             <a:off x="9144000" y="0"/>
-            <a:ext cx="5486040" cy="8229960"/>
+            <a:ext cx="5485680" cy="8229600"/>
           </a:xfrm>
           <a:prstGeom prst="rect">
             <a:avLst/>
@@ -3942,7 +3810,7 @@
         <p:spPr>
           <a:xfrm>
             <a:off x="9450720" y="2097000"/>
-            <a:ext cx="4872240" cy="4035960"/>
+            <a:ext cx="4871880" cy="4035600"/>
           </a:xfrm>
           <a:prstGeom prst="rect">
             <a:avLst/>
@@ -3959,9 +3827,9 @@
           <p:nvPr/>
         </p:nvSpPr>
         <p:spPr>
-          <a:xfrm>
-            <a:off x="859320" y="675000"/>
-            <a:ext cx="7425000" cy="4234320"/>
+          <a:xfrm rot="18600">
+            <a:off x="847800" y="480240"/>
+            <a:ext cx="7960680" cy="4233960"/>
           </a:xfrm>
           <a:prstGeom prst="rect">
             <a:avLst/>
@@ -4016,7 +3884,7 @@
         <p:spPr>
           <a:xfrm>
             <a:off x="859320" y="5278320"/>
-            <a:ext cx="7425000" cy="1570680"/>
+            <a:ext cx="7424640" cy="1570320"/>
           </a:xfrm>
           <a:prstGeom prst="rect">
             <a:avLst/>
@@ -4064,68 +3932,14 @@
       </p:sp>
       <p:sp>
         <p:nvSpPr>
-          <p:cNvPr id="50" name="Shape 3"/>
+          <p:cNvPr id="50" name="Text 4"/>
           <p:cNvSpPr/>
           <p:nvPr/>
         </p:nvSpPr>
         <p:spPr>
           <a:xfrm>
-            <a:off x="859320" y="7143840"/>
-            <a:ext cx="392400" cy="392400"/>
-          </a:xfrm>
-          <a:prstGeom prst="roundRect">
-            <a:avLst>
-              <a:gd name="adj" fmla="val 23277465"/>
-            </a:avLst>
-          </a:prstGeom>
-          <a:noFill/>
-          <a:ln w="7620">
-            <a:solidFill>
-              <a:srgbClr val="ffffff"/>
-            </a:solidFill>
-            <a:round/>
-          </a:ln>
-        </p:spPr>
-        <p:style>
-          <a:lnRef idx="0"/>
-          <a:fillRef idx="0"/>
-          <a:effectRef idx="0"/>
-          <a:fontRef idx="minor"/>
-        </p:style>
-      </p:sp>
-      <p:pic>
-        <p:nvPicPr>
-          <p:cNvPr id="51" name="Image 3" descr="preencoded.png"/>
-          <p:cNvPicPr/>
-          <p:nvPr/>
-        </p:nvPicPr>
-        <p:blipFill>
-          <a:blip r:embed="rId4"/>
-          <a:stretch/>
-        </p:blipFill>
-        <p:spPr>
-          <a:xfrm>
-            <a:off x="866880" y="7151400"/>
-            <a:ext cx="377280" cy="377280"/>
-          </a:xfrm>
-          <a:prstGeom prst="rect">
-            <a:avLst/>
-          </a:prstGeom>
-          <a:ln w="0">
-            <a:noFill/>
-          </a:ln>
-        </p:spPr>
-      </p:pic>
-      <p:sp>
-        <p:nvSpPr>
-          <p:cNvPr id="52" name="Text 4"/>
-          <p:cNvSpPr/>
-          <p:nvPr/>
-        </p:nvSpPr>
-        <p:spPr>
-          <a:xfrm>
-            <a:off x="1374840" y="7125480"/>
-            <a:ext cx="2830680" cy="429480"/>
+            <a:off x="870840" y="7413480"/>
+            <a:ext cx="2830320" cy="429120"/>
           </a:xfrm>
           <a:prstGeom prst="rect">
             <a:avLst/>
@@ -4163,7 +3977,7 @@
                 <a:latin typeface="Roboto"/>
                 <a:ea typeface="Roboto"/>
               </a:rPr>
-              <a:t>by Python Anaconda</a:t>
+              <a:t>By Shivam Vishwakarma</a:t>
             </a:r>
             <a:endParaRPr b="0" lang="en-IN" sz="2420" spc="-1" strike="noStrike">
               <a:latin typeface="Arial"/>
@@ -4203,7 +4017,7 @@
       </p:grpSpPr>
       <p:pic>
         <p:nvPicPr>
-          <p:cNvPr id="156" name="Image 0" descr="preencoded.png"/>
+          <p:cNvPr id="154" name="Image 0" descr="preencoded.png"/>
           <p:cNvPicPr/>
           <p:nvPr/>
         </p:nvPicPr>
@@ -4214,7 +4028,7 @@
         <p:spPr>
           <a:xfrm>
             <a:off x="0" y="0"/>
-            <a:ext cx="14630040" cy="8229240"/>
+            <a:ext cx="14629680" cy="8228880"/>
           </a:xfrm>
           <a:prstGeom prst="rect">
             <a:avLst/>
@@ -4226,14 +4040,14 @@
       </p:pic>
       <p:sp>
         <p:nvSpPr>
-          <p:cNvPr id="157" name="Shape 0"/>
+          <p:cNvPr id="155" name="Shape 0"/>
           <p:cNvSpPr/>
           <p:nvPr/>
         </p:nvSpPr>
         <p:spPr>
           <a:xfrm>
             <a:off x="0" y="0"/>
-            <a:ext cx="14630040" cy="8231040"/>
+            <a:ext cx="14629680" cy="8230680"/>
           </a:xfrm>
           <a:prstGeom prst="rect">
             <a:avLst/>
@@ -4256,7 +4070,7 @@
       </p:sp>
       <p:pic>
         <p:nvPicPr>
-          <p:cNvPr id="158" name="Image 1" descr="preencoded.png"/>
+          <p:cNvPr id="156" name="Image 1" descr="preencoded.png"/>
           <p:cNvPicPr/>
           <p:nvPr/>
         </p:nvPicPr>
@@ -4267,7 +4081,7 @@
         <p:spPr>
           <a:xfrm>
             <a:off x="0" y="0"/>
-            <a:ext cx="14630040" cy="2605680"/>
+            <a:ext cx="14629680" cy="2605320"/>
           </a:xfrm>
           <a:prstGeom prst="rect">
             <a:avLst/>
@@ -4279,7 +4093,7 @@
       </p:pic>
       <p:pic>
         <p:nvPicPr>
-          <p:cNvPr id="159" name="Image 2" descr="preencoded.png"/>
+          <p:cNvPr id="157" name="Image 2" descr="preencoded.png"/>
           <p:cNvPicPr/>
           <p:nvPr/>
         </p:nvPicPr>
@@ -4290,7 +4104,7 @@
         <p:spPr>
           <a:xfrm>
             <a:off x="4866840" y="260640"/>
-            <a:ext cx="4896360" cy="2084400"/>
+            <a:ext cx="4896000" cy="2084040"/>
           </a:xfrm>
           <a:prstGeom prst="rect">
             <a:avLst/>
@@ -4302,14 +4116,14 @@
       </p:pic>
       <p:sp>
         <p:nvSpPr>
-          <p:cNvPr id="160" name="Text 1"/>
+          <p:cNvPr id="158" name="Text 1"/>
           <p:cNvSpPr/>
           <p:nvPr/>
         </p:nvSpPr>
         <p:spPr>
           <a:xfrm>
             <a:off x="1621440" y="3179160"/>
-            <a:ext cx="5211360" cy="650880"/>
+            <a:ext cx="5211000" cy="650520"/>
           </a:xfrm>
           <a:prstGeom prst="rect">
             <a:avLst/>
@@ -4357,7 +4171,7 @@
       </p:sp>
       <p:pic>
         <p:nvPicPr>
-          <p:cNvPr id="161" name="Image 3" descr="preencoded.png"/>
+          <p:cNvPr id="159" name="Image 3" descr="preencoded.png"/>
           <p:cNvPicPr/>
           <p:nvPr/>
         </p:nvPicPr>
@@ -4368,7 +4182,7 @@
         <p:spPr>
           <a:xfrm>
             <a:off x="1621440" y="4143240"/>
-            <a:ext cx="520920" cy="520920"/>
+            <a:ext cx="520560" cy="520560"/>
           </a:xfrm>
           <a:prstGeom prst="rect">
             <a:avLst/>
@@ -4380,14 +4194,14 @@
       </p:pic>
       <p:sp>
         <p:nvSpPr>
-          <p:cNvPr id="162" name="Text 2"/>
+          <p:cNvPr id="160" name="Text 2"/>
           <p:cNvSpPr/>
           <p:nvPr/>
         </p:nvSpPr>
         <p:spPr>
           <a:xfrm>
             <a:off x="1621440" y="4872600"/>
-            <a:ext cx="2605680" cy="325440"/>
+            <a:ext cx="2605320" cy="325080"/>
           </a:xfrm>
           <a:prstGeom prst="rect">
             <a:avLst/>
@@ -4435,14 +4249,14 @@
       </p:sp>
       <p:sp>
         <p:nvSpPr>
-          <p:cNvPr id="163" name="Text 3"/>
+          <p:cNvPr id="161" name="Text 3"/>
           <p:cNvSpPr/>
           <p:nvPr/>
         </p:nvSpPr>
         <p:spPr>
           <a:xfrm>
             <a:off x="1621440" y="5323680"/>
-            <a:ext cx="3587040" cy="2000520"/>
+            <a:ext cx="3586680" cy="2000160"/>
           </a:xfrm>
           <a:prstGeom prst="rect">
             <a:avLst/>
@@ -4490,7 +4304,7 @@
       </p:sp>
       <p:pic>
         <p:nvPicPr>
-          <p:cNvPr id="164" name="Image 4" descr="preencoded.png"/>
+          <p:cNvPr id="162" name="Image 4" descr="preencoded.png"/>
           <p:cNvPicPr/>
           <p:nvPr/>
         </p:nvPicPr>
@@ -4501,7 +4315,7 @@
         <p:spPr>
           <a:xfrm>
             <a:off x="5521320" y="4143240"/>
-            <a:ext cx="520920" cy="520920"/>
+            <a:ext cx="520560" cy="520560"/>
           </a:xfrm>
           <a:prstGeom prst="rect">
             <a:avLst/>
@@ -4513,14 +4327,14 @@
       </p:pic>
       <p:sp>
         <p:nvSpPr>
-          <p:cNvPr id="165" name="Text 4"/>
+          <p:cNvPr id="163" name="Text 4"/>
           <p:cNvSpPr/>
           <p:nvPr/>
         </p:nvSpPr>
         <p:spPr>
           <a:xfrm>
             <a:off x="5521320" y="4872600"/>
-            <a:ext cx="2605680" cy="325440"/>
+            <a:ext cx="2605320" cy="325080"/>
           </a:xfrm>
           <a:prstGeom prst="rect">
             <a:avLst/>
@@ -4568,14 +4382,14 @@
       </p:sp>
       <p:sp>
         <p:nvSpPr>
-          <p:cNvPr id="166" name="Text 5"/>
+          <p:cNvPr id="164" name="Text 5"/>
           <p:cNvSpPr/>
           <p:nvPr/>
         </p:nvSpPr>
         <p:spPr>
           <a:xfrm>
             <a:off x="5521320" y="5323680"/>
-            <a:ext cx="3587040" cy="2334240"/>
+            <a:ext cx="3586680" cy="2333880"/>
           </a:xfrm>
           <a:prstGeom prst="rect">
             <a:avLst/>
@@ -4623,7 +4437,7 @@
       </p:sp>
       <p:pic>
         <p:nvPicPr>
-          <p:cNvPr id="167" name="Image 5" descr="preencoded.png"/>
+          <p:cNvPr id="165" name="Image 5" descr="preencoded.png"/>
           <p:cNvPicPr/>
           <p:nvPr/>
         </p:nvPicPr>
@@ -4634,7 +4448,7 @@
         <p:spPr>
           <a:xfrm>
             <a:off x="9421560" y="4143240"/>
-            <a:ext cx="520920" cy="520920"/>
+            <a:ext cx="520560" cy="520560"/>
           </a:xfrm>
           <a:prstGeom prst="rect">
             <a:avLst/>
@@ -4646,14 +4460,14 @@
       </p:pic>
       <p:sp>
         <p:nvSpPr>
-          <p:cNvPr id="168" name="Text 6"/>
+          <p:cNvPr id="166" name="Text 6"/>
           <p:cNvSpPr/>
           <p:nvPr/>
         </p:nvSpPr>
         <p:spPr>
           <a:xfrm>
             <a:off x="9421560" y="4872600"/>
-            <a:ext cx="2605680" cy="325440"/>
+            <a:ext cx="2605320" cy="325080"/>
           </a:xfrm>
           <a:prstGeom prst="rect">
             <a:avLst/>
@@ -4701,14 +4515,14 @@
       </p:sp>
       <p:sp>
         <p:nvSpPr>
-          <p:cNvPr id="169" name="Text 7"/>
+          <p:cNvPr id="167" name="Text 7"/>
           <p:cNvSpPr/>
           <p:nvPr/>
         </p:nvSpPr>
         <p:spPr>
           <a:xfrm>
             <a:off x="9421560" y="5323680"/>
-            <a:ext cx="3587400" cy="2000520"/>
+            <a:ext cx="3587040" cy="2000160"/>
           </a:xfrm>
           <a:prstGeom prst="rect">
             <a:avLst/>
@@ -4786,7 +4600,7 @@
       </p:grpSpPr>
       <p:pic>
         <p:nvPicPr>
-          <p:cNvPr id="170" name="Image 0" descr="preencoded.png"/>
+          <p:cNvPr id="168" name="Image 0" descr="preencoded.png"/>
           <p:cNvPicPr/>
           <p:nvPr/>
         </p:nvPicPr>
@@ -4797,7 +4611,7 @@
         <p:spPr>
           <a:xfrm>
             <a:off x="0" y="0"/>
-            <a:ext cx="14630040" cy="8229240"/>
+            <a:ext cx="14629680" cy="8228880"/>
           </a:xfrm>
           <a:prstGeom prst="rect">
             <a:avLst/>
@@ -4809,14 +4623,14 @@
       </p:pic>
       <p:sp>
         <p:nvSpPr>
-          <p:cNvPr id="171" name="Shape 0"/>
+          <p:cNvPr id="169" name="Shape 0"/>
           <p:cNvSpPr/>
           <p:nvPr/>
         </p:nvSpPr>
         <p:spPr>
           <a:xfrm>
             <a:off x="0" y="0"/>
-            <a:ext cx="14630040" cy="8229240"/>
+            <a:ext cx="14629680" cy="8228880"/>
           </a:xfrm>
           <a:prstGeom prst="rect">
             <a:avLst/>
@@ -4839,7 +4653,7 @@
       </p:sp>
       <p:pic>
         <p:nvPicPr>
-          <p:cNvPr id="172" name="Image 1" descr="preencoded.png"/>
+          <p:cNvPr id="170" name="Image 1" descr="preencoded.png"/>
           <p:cNvPicPr/>
           <p:nvPr/>
         </p:nvPicPr>
@@ -4850,7 +4664,7 @@
         <p:spPr>
           <a:xfrm>
             <a:off x="9144000" y="0"/>
-            <a:ext cx="5486040" cy="8229240"/>
+            <a:ext cx="5485680" cy="8228880"/>
           </a:xfrm>
           <a:prstGeom prst="rect">
             <a:avLst/>
@@ -4862,7 +4676,7 @@
       </p:pic>
       <p:pic>
         <p:nvPicPr>
-          <p:cNvPr id="173" name="Image 2" descr="preencoded.png"/>
+          <p:cNvPr id="171" name="Image 2" descr="preencoded.png"/>
           <p:cNvPicPr/>
           <p:nvPr/>
         </p:nvPicPr>
@@ -4873,7 +4687,7 @@
         <p:spPr>
           <a:xfrm>
             <a:off x="9452880" y="3114720"/>
-            <a:ext cx="4868640" cy="2000160"/>
+            <a:ext cx="4868280" cy="1999800"/>
           </a:xfrm>
           <a:prstGeom prst="rect">
             <a:avLst/>
@@ -4885,14 +4699,14 @@
       </p:pic>
       <p:sp>
         <p:nvSpPr>
-          <p:cNvPr id="174" name="Text 1"/>
+          <p:cNvPr id="172" name="Text 1"/>
           <p:cNvSpPr/>
           <p:nvPr/>
         </p:nvSpPr>
         <p:spPr>
           <a:xfrm>
             <a:off x="864000" y="2358720"/>
-            <a:ext cx="6171840" cy="771120"/>
+            <a:ext cx="6171480" cy="770760"/>
           </a:xfrm>
           <a:prstGeom prst="rect">
             <a:avLst/>
@@ -4940,14 +4754,14 @@
       </p:sp>
       <p:sp>
         <p:nvSpPr>
-          <p:cNvPr id="175" name="Text 2"/>
+          <p:cNvPr id="173" name="Text 2"/>
           <p:cNvSpPr/>
           <p:nvPr/>
         </p:nvSpPr>
         <p:spPr>
           <a:xfrm>
             <a:off x="864000" y="3500640"/>
-            <a:ext cx="7415640" cy="2369880"/>
+            <a:ext cx="7415280" cy="2369520"/>
           </a:xfrm>
           <a:prstGeom prst="rect">
             <a:avLst/>
@@ -5025,7 +4839,7 @@
       </p:grpSpPr>
       <p:pic>
         <p:nvPicPr>
-          <p:cNvPr id="53" name="Image 0" descr="preencoded.png"/>
+          <p:cNvPr id="51" name="Image 0" descr="preencoded.png"/>
           <p:cNvPicPr/>
           <p:nvPr/>
         </p:nvPicPr>
@@ -5036,7 +4850,7 @@
         <p:spPr>
           <a:xfrm>
             <a:off x="0" y="0"/>
-            <a:ext cx="14630040" cy="8229240"/>
+            <a:ext cx="14629680" cy="8228880"/>
           </a:xfrm>
           <a:prstGeom prst="rect">
             <a:avLst/>
@@ -5048,14 +4862,14 @@
       </p:pic>
       <p:sp>
         <p:nvSpPr>
-          <p:cNvPr id="54" name="Shape 0"/>
+          <p:cNvPr id="52" name="Shape 0"/>
           <p:cNvSpPr/>
           <p:nvPr/>
         </p:nvSpPr>
         <p:spPr>
           <a:xfrm>
             <a:off x="0" y="0"/>
-            <a:ext cx="14630040" cy="8229240"/>
+            <a:ext cx="14629680" cy="8228880"/>
           </a:xfrm>
           <a:prstGeom prst="rect">
             <a:avLst/>
@@ -5078,7 +4892,7 @@
       </p:sp>
       <p:pic>
         <p:nvPicPr>
-          <p:cNvPr id="55" name="Image 1" descr="preencoded.png"/>
+          <p:cNvPr id="53" name="Image 1" descr="preencoded.png"/>
           <p:cNvPicPr/>
           <p:nvPr/>
         </p:nvPicPr>
@@ -5089,7 +4903,7 @@
         <p:spPr>
           <a:xfrm>
             <a:off x="0" y="0"/>
-            <a:ext cx="5486040" cy="8229240"/>
+            <a:ext cx="5485680" cy="8228880"/>
           </a:xfrm>
           <a:prstGeom prst="rect">
             <a:avLst/>
@@ -5101,14 +4915,14 @@
       </p:pic>
       <p:sp>
         <p:nvSpPr>
-          <p:cNvPr id="56" name="Text 1"/>
+          <p:cNvPr id="54" name="Text 1"/>
           <p:cNvSpPr/>
           <p:nvPr/>
         </p:nvSpPr>
         <p:spPr>
           <a:xfrm>
             <a:off x="6091200" y="937440"/>
-            <a:ext cx="4320360" cy="539640"/>
+            <a:ext cx="4320000" cy="539280"/>
           </a:xfrm>
           <a:prstGeom prst="rect">
             <a:avLst/>
@@ -5156,14 +4970,14 @@
       </p:sp>
       <p:sp>
         <p:nvSpPr>
-          <p:cNvPr id="57" name="Shape 2"/>
+          <p:cNvPr id="55" name="Shape 2"/>
           <p:cNvSpPr/>
           <p:nvPr/>
         </p:nvSpPr>
         <p:spPr>
           <a:xfrm>
             <a:off x="6091200" y="1931040"/>
-            <a:ext cx="388440" cy="388440"/>
+            <a:ext cx="388080" cy="388080"/>
           </a:xfrm>
           <a:prstGeom prst="roundRect">
             <a:avLst>
@@ -5189,14 +5003,14 @@
       </p:sp>
       <p:sp>
         <p:nvSpPr>
-          <p:cNvPr id="58" name="Text 3"/>
+          <p:cNvPr id="56" name="Text 3"/>
           <p:cNvSpPr/>
           <p:nvPr/>
         </p:nvSpPr>
         <p:spPr>
           <a:xfrm>
             <a:off x="6211800" y="1995840"/>
-            <a:ext cx="146880" cy="258840"/>
+            <a:ext cx="146520" cy="258480"/>
           </a:xfrm>
           <a:prstGeom prst="rect">
             <a:avLst/>
@@ -5244,14 +5058,14 @@
       </p:sp>
       <p:sp>
         <p:nvSpPr>
-          <p:cNvPr id="59" name="Text 4"/>
+          <p:cNvPr id="57" name="Text 4"/>
           <p:cNvSpPr/>
           <p:nvPr/>
         </p:nvSpPr>
         <p:spPr>
           <a:xfrm>
             <a:off x="6652800" y="1931040"/>
-            <a:ext cx="2160000" cy="269640"/>
+            <a:ext cx="2159640" cy="269280"/>
           </a:xfrm>
           <a:prstGeom prst="rect">
             <a:avLst/>
@@ -5299,14 +5113,14 @@
       </p:sp>
       <p:sp>
         <p:nvSpPr>
-          <p:cNvPr id="60" name="Text 5"/>
+          <p:cNvPr id="58" name="Text 5"/>
           <p:cNvSpPr/>
           <p:nvPr/>
         </p:nvSpPr>
         <p:spPr>
           <a:xfrm>
             <a:off x="6652800" y="2304720"/>
-            <a:ext cx="7372440" cy="829440"/>
+            <a:ext cx="7372080" cy="829080"/>
           </a:xfrm>
           <a:prstGeom prst="rect">
             <a:avLst/>
@@ -5354,14 +5168,14 @@
       </p:sp>
       <p:sp>
         <p:nvSpPr>
-          <p:cNvPr id="61" name="Shape 6"/>
+          <p:cNvPr id="59" name="Shape 6"/>
           <p:cNvSpPr/>
           <p:nvPr/>
         </p:nvSpPr>
         <p:spPr>
           <a:xfrm>
             <a:off x="6091200" y="3501360"/>
-            <a:ext cx="388440" cy="388440"/>
+            <a:ext cx="388080" cy="388080"/>
           </a:xfrm>
           <a:prstGeom prst="roundRect">
             <a:avLst>
@@ -5387,14 +5201,14 @@
       </p:sp>
       <p:sp>
         <p:nvSpPr>
-          <p:cNvPr id="62" name="Text 7"/>
+          <p:cNvPr id="60" name="Text 7"/>
           <p:cNvSpPr/>
           <p:nvPr/>
         </p:nvSpPr>
         <p:spPr>
           <a:xfrm>
             <a:off x="6211800" y="3566160"/>
-            <a:ext cx="146880" cy="258840"/>
+            <a:ext cx="146520" cy="258480"/>
           </a:xfrm>
           <a:prstGeom prst="rect">
             <a:avLst/>
@@ -5442,14 +5256,14 @@
       </p:sp>
       <p:sp>
         <p:nvSpPr>
-          <p:cNvPr id="63" name="Text 8"/>
+          <p:cNvPr id="61" name="Text 8"/>
           <p:cNvSpPr/>
           <p:nvPr/>
         </p:nvSpPr>
         <p:spPr>
           <a:xfrm>
             <a:off x="6652800" y="3501360"/>
-            <a:ext cx="2160000" cy="269640"/>
+            <a:ext cx="2159640" cy="269280"/>
           </a:xfrm>
           <a:prstGeom prst="rect">
             <a:avLst/>
@@ -5497,14 +5311,14 @@
       </p:sp>
       <p:sp>
         <p:nvSpPr>
-          <p:cNvPr id="64" name="Text 9"/>
+          <p:cNvPr id="62" name="Text 9"/>
           <p:cNvSpPr/>
           <p:nvPr/>
         </p:nvSpPr>
         <p:spPr>
           <a:xfrm>
             <a:off x="6652800" y="3875040"/>
-            <a:ext cx="7372440" cy="552960"/>
+            <a:ext cx="7372080" cy="552600"/>
           </a:xfrm>
           <a:prstGeom prst="rect">
             <a:avLst/>
@@ -5552,14 +5366,14 @@
       </p:sp>
       <p:sp>
         <p:nvSpPr>
-          <p:cNvPr id="65" name="Shape 10"/>
+          <p:cNvPr id="63" name="Shape 10"/>
           <p:cNvSpPr/>
           <p:nvPr/>
         </p:nvSpPr>
         <p:spPr>
           <a:xfrm>
             <a:off x="6091200" y="4795200"/>
-            <a:ext cx="388440" cy="388440"/>
+            <a:ext cx="388080" cy="388080"/>
           </a:xfrm>
           <a:prstGeom prst="roundRect">
             <a:avLst>
@@ -5585,14 +5399,14 @@
       </p:sp>
       <p:sp>
         <p:nvSpPr>
-          <p:cNvPr id="66" name="Text 11"/>
+          <p:cNvPr id="64" name="Text 11"/>
           <p:cNvSpPr/>
           <p:nvPr/>
         </p:nvSpPr>
         <p:spPr>
           <a:xfrm>
             <a:off x="6211800" y="4860000"/>
-            <a:ext cx="146880" cy="258840"/>
+            <a:ext cx="146520" cy="258480"/>
           </a:xfrm>
           <a:prstGeom prst="rect">
             <a:avLst/>
@@ -5640,14 +5454,14 @@
       </p:sp>
       <p:sp>
         <p:nvSpPr>
-          <p:cNvPr id="67" name="Text 12"/>
+          <p:cNvPr id="65" name="Text 12"/>
           <p:cNvSpPr/>
           <p:nvPr/>
         </p:nvSpPr>
         <p:spPr>
           <a:xfrm>
             <a:off x="6652800" y="4795200"/>
-            <a:ext cx="2160000" cy="269640"/>
+            <a:ext cx="2159640" cy="269280"/>
           </a:xfrm>
           <a:prstGeom prst="rect">
             <a:avLst/>
@@ -5695,14 +5509,14 @@
       </p:sp>
       <p:sp>
         <p:nvSpPr>
-          <p:cNvPr id="68" name="Text 13"/>
+          <p:cNvPr id="66" name="Text 13"/>
           <p:cNvSpPr/>
           <p:nvPr/>
         </p:nvSpPr>
         <p:spPr>
           <a:xfrm>
             <a:off x="6652800" y="5168520"/>
-            <a:ext cx="7372440" cy="552960"/>
+            <a:ext cx="7372080" cy="552600"/>
           </a:xfrm>
           <a:prstGeom prst="rect">
             <a:avLst/>
@@ -5750,14 +5564,14 @@
       </p:sp>
       <p:sp>
         <p:nvSpPr>
-          <p:cNvPr id="69" name="Shape 14"/>
+          <p:cNvPr id="67" name="Shape 14"/>
           <p:cNvSpPr/>
           <p:nvPr/>
         </p:nvSpPr>
         <p:spPr>
           <a:xfrm>
             <a:off x="6091200" y="6088680"/>
-            <a:ext cx="388440" cy="388440"/>
+            <a:ext cx="388080" cy="388080"/>
           </a:xfrm>
           <a:prstGeom prst="roundRect">
             <a:avLst>
@@ -5783,14 +5597,14 @@
       </p:sp>
       <p:sp>
         <p:nvSpPr>
-          <p:cNvPr id="70" name="Text 15"/>
+          <p:cNvPr id="68" name="Text 15"/>
           <p:cNvSpPr/>
           <p:nvPr/>
         </p:nvSpPr>
         <p:spPr>
           <a:xfrm>
             <a:off x="6211800" y="6153480"/>
-            <a:ext cx="146880" cy="258840"/>
+            <a:ext cx="146520" cy="258480"/>
           </a:xfrm>
           <a:prstGeom prst="rect">
             <a:avLst/>
@@ -5838,14 +5652,14 @@
       </p:sp>
       <p:sp>
         <p:nvSpPr>
-          <p:cNvPr id="71" name="Text 16"/>
+          <p:cNvPr id="69" name="Text 16"/>
           <p:cNvSpPr/>
           <p:nvPr/>
         </p:nvSpPr>
         <p:spPr>
           <a:xfrm>
             <a:off x="6652800" y="6088680"/>
-            <a:ext cx="2160000" cy="269640"/>
+            <a:ext cx="2159640" cy="269280"/>
           </a:xfrm>
           <a:prstGeom prst="rect">
             <a:avLst/>
@@ -5893,14 +5707,14 @@
       </p:sp>
       <p:sp>
         <p:nvSpPr>
-          <p:cNvPr id="72" name="Text 17"/>
+          <p:cNvPr id="70" name="Text 17"/>
           <p:cNvSpPr/>
           <p:nvPr/>
         </p:nvSpPr>
         <p:spPr>
           <a:xfrm>
             <a:off x="6652800" y="6462360"/>
-            <a:ext cx="7372440" cy="829440"/>
+            <a:ext cx="7372080" cy="829080"/>
           </a:xfrm>
           <a:prstGeom prst="rect">
             <a:avLst/>
@@ -5978,7 +5792,7 @@
       </p:grpSpPr>
       <p:pic>
         <p:nvPicPr>
-          <p:cNvPr id="73" name="Image 0" descr="preencoded.png"/>
+          <p:cNvPr id="71" name="Image 0" descr="preencoded.png"/>
           <p:cNvPicPr/>
           <p:nvPr/>
         </p:nvPicPr>
@@ -5989,7 +5803,7 @@
         <p:spPr>
           <a:xfrm>
             <a:off x="0" y="0"/>
-            <a:ext cx="14630040" cy="8229240"/>
+            <a:ext cx="14629680" cy="8228880"/>
           </a:xfrm>
           <a:prstGeom prst="rect">
             <a:avLst/>
@@ -6001,14 +5815,14 @@
       </p:pic>
       <p:sp>
         <p:nvSpPr>
-          <p:cNvPr id="74" name="Shape 0"/>
+          <p:cNvPr id="72" name="Shape 0"/>
           <p:cNvSpPr/>
           <p:nvPr/>
         </p:nvSpPr>
         <p:spPr>
           <a:xfrm>
             <a:off x="0" y="0"/>
-            <a:ext cx="14630040" cy="8229240"/>
+            <a:ext cx="14629680" cy="8228880"/>
           </a:xfrm>
           <a:prstGeom prst="rect">
             <a:avLst/>
@@ -6031,7 +5845,7 @@
       </p:sp>
       <p:pic>
         <p:nvPicPr>
-          <p:cNvPr id="75" name="Image 1" descr="preencoded.png"/>
+          <p:cNvPr id="73" name="Image 1" descr="preencoded.png"/>
           <p:cNvPicPr/>
           <p:nvPr/>
         </p:nvPicPr>
@@ -6042,7 +5856,7 @@
         <p:spPr>
           <a:xfrm>
             <a:off x="0" y="0"/>
-            <a:ext cx="14630040" cy="2277720"/>
+            <a:ext cx="14629680" cy="2277360"/>
           </a:xfrm>
           <a:prstGeom prst="rect">
             <a:avLst/>
@@ -6054,7 +5868,7 @@
       </p:pic>
       <p:pic>
         <p:nvPicPr>
-          <p:cNvPr id="76" name="Image 2" descr="preencoded.png"/>
+          <p:cNvPr id="74" name="Image 2" descr="preencoded.png"/>
           <p:cNvPicPr/>
           <p:nvPr/>
         </p:nvPicPr>
@@ -6065,7 +5879,7 @@
         <p:spPr>
           <a:xfrm>
             <a:off x="6149520" y="227880"/>
-            <a:ext cx="2331360" cy="1822320"/>
+            <a:ext cx="2331000" cy="1821960"/>
           </a:xfrm>
           <a:prstGeom prst="rect">
             <a:avLst/>
@@ -6077,14 +5891,14 @@
       </p:pic>
       <p:sp>
         <p:nvSpPr>
-          <p:cNvPr id="77" name="Text 1"/>
+          <p:cNvPr id="75" name="Text 1"/>
           <p:cNvSpPr/>
           <p:nvPr/>
         </p:nvSpPr>
         <p:spPr>
           <a:xfrm>
             <a:off x="2337480" y="2783520"/>
-            <a:ext cx="4555800" cy="569160"/>
+            <a:ext cx="4555440" cy="568800"/>
           </a:xfrm>
           <a:prstGeom prst="rect">
             <a:avLst/>
@@ -6132,14 +5946,14 @@
       </p:sp>
       <p:sp>
         <p:nvSpPr>
-          <p:cNvPr id="78" name="Shape 2"/>
+          <p:cNvPr id="76" name="Shape 2"/>
           <p:cNvSpPr/>
           <p:nvPr/>
         </p:nvSpPr>
         <p:spPr>
           <a:xfrm>
             <a:off x="2337480" y="3899520"/>
-            <a:ext cx="9955440" cy="22680"/>
+            <a:ext cx="9955080" cy="22320"/>
           </a:xfrm>
           <a:prstGeom prst="roundRect">
             <a:avLst>
@@ -6162,14 +5976,14 @@
       </p:sp>
       <p:sp>
         <p:nvSpPr>
-          <p:cNvPr id="79" name="Shape 3"/>
+          <p:cNvPr id="77" name="Shape 3"/>
           <p:cNvSpPr/>
           <p:nvPr/>
         </p:nvSpPr>
         <p:spPr>
           <a:xfrm>
             <a:off x="3502080" y="3899520"/>
-            <a:ext cx="22680" cy="637560"/>
+            <a:ext cx="22320" cy="637200"/>
           </a:xfrm>
           <a:prstGeom prst="roundRect">
             <a:avLst>
@@ -6192,14 +6006,14 @@
       </p:sp>
       <p:sp>
         <p:nvSpPr>
-          <p:cNvPr id="80" name="Shape 4"/>
+          <p:cNvPr id="78" name="Shape 4"/>
           <p:cNvSpPr/>
           <p:nvPr/>
         </p:nvSpPr>
         <p:spPr>
           <a:xfrm>
             <a:off x="3308400" y="3694680"/>
-            <a:ext cx="409680" cy="409680"/>
+            <a:ext cx="409320" cy="409320"/>
           </a:xfrm>
           <a:prstGeom prst="roundRect">
             <a:avLst>
@@ -6225,14 +6039,14 @@
       </p:sp>
       <p:sp>
         <p:nvSpPr>
-          <p:cNvPr id="81" name="Text 5"/>
+          <p:cNvPr id="79" name="Text 5"/>
           <p:cNvSpPr/>
           <p:nvPr/>
         </p:nvSpPr>
         <p:spPr>
           <a:xfrm>
             <a:off x="3435840" y="3763080"/>
-            <a:ext cx="155160" cy="272880"/>
+            <a:ext cx="154800" cy="272520"/>
           </a:xfrm>
           <a:prstGeom prst="rect">
             <a:avLst/>
@@ -6280,14 +6094,14 @@
       </p:sp>
       <p:sp>
         <p:nvSpPr>
-          <p:cNvPr id="82" name="Text 6"/>
+          <p:cNvPr id="80" name="Text 6"/>
           <p:cNvSpPr/>
           <p:nvPr/>
         </p:nvSpPr>
         <p:spPr>
           <a:xfrm>
             <a:off x="2519640" y="4719600"/>
-            <a:ext cx="1987560" cy="284400"/>
+            <a:ext cx="1987200" cy="284040"/>
           </a:xfrm>
           <a:prstGeom prst="rect">
             <a:avLst/>
@@ -6335,14 +6149,14 @@
       </p:sp>
       <p:sp>
         <p:nvSpPr>
-          <p:cNvPr id="83" name="Text 7"/>
+          <p:cNvPr id="81" name="Text 7"/>
           <p:cNvSpPr/>
           <p:nvPr/>
         </p:nvSpPr>
         <p:spPr>
           <a:xfrm>
             <a:off x="2519640" y="4933800"/>
-            <a:ext cx="1987560" cy="2332440"/>
+            <a:ext cx="1987200" cy="2332080"/>
           </a:xfrm>
           <a:prstGeom prst="rect">
             <a:avLst/>
@@ -6390,14 +6204,14 @@
       </p:sp>
       <p:sp>
         <p:nvSpPr>
-          <p:cNvPr id="84" name="Shape 8"/>
+          <p:cNvPr id="82" name="Shape 8"/>
           <p:cNvSpPr/>
           <p:nvPr/>
         </p:nvSpPr>
         <p:spPr>
           <a:xfrm>
             <a:off x="6036480" y="3899520"/>
-            <a:ext cx="22680" cy="637560"/>
+            <a:ext cx="22320" cy="637200"/>
           </a:xfrm>
           <a:prstGeom prst="roundRect">
             <a:avLst>
@@ -6420,14 +6234,14 @@
       </p:sp>
       <p:sp>
         <p:nvSpPr>
-          <p:cNvPr id="85" name="Shape 9"/>
+          <p:cNvPr id="83" name="Shape 9"/>
           <p:cNvSpPr/>
           <p:nvPr/>
         </p:nvSpPr>
         <p:spPr>
           <a:xfrm>
             <a:off x="5842800" y="3694680"/>
-            <a:ext cx="409680" cy="409680"/>
+            <a:ext cx="409320" cy="409320"/>
           </a:xfrm>
           <a:prstGeom prst="roundRect">
             <a:avLst>
@@ -6453,14 +6267,14 @@
       </p:sp>
       <p:sp>
         <p:nvSpPr>
-          <p:cNvPr id="86" name="Text 10"/>
+          <p:cNvPr id="84" name="Text 10"/>
           <p:cNvSpPr/>
           <p:nvPr/>
         </p:nvSpPr>
         <p:spPr>
           <a:xfrm>
             <a:off x="5969880" y="3763080"/>
-            <a:ext cx="155160" cy="272880"/>
+            <a:ext cx="154800" cy="272520"/>
           </a:xfrm>
           <a:prstGeom prst="rect">
             <a:avLst/>
@@ -6508,14 +6322,14 @@
       </p:sp>
       <p:sp>
         <p:nvSpPr>
-          <p:cNvPr id="87" name="Text 11"/>
+          <p:cNvPr id="85" name="Text 11"/>
           <p:cNvSpPr/>
           <p:nvPr/>
         </p:nvSpPr>
         <p:spPr>
           <a:xfrm>
             <a:off x="5053680" y="4719600"/>
-            <a:ext cx="1987560" cy="284400"/>
+            <a:ext cx="1987200" cy="284040"/>
           </a:xfrm>
           <a:prstGeom prst="rect">
             <a:avLst/>
@@ -6563,14 +6377,14 @@
       </p:sp>
       <p:sp>
         <p:nvSpPr>
-          <p:cNvPr id="88" name="Text 12"/>
+          <p:cNvPr id="86" name="Text 12"/>
           <p:cNvSpPr/>
           <p:nvPr/>
         </p:nvSpPr>
         <p:spPr>
           <a:xfrm>
             <a:off x="5053680" y="5113800"/>
-            <a:ext cx="1987560" cy="2040840"/>
+            <a:ext cx="1987200" cy="2040480"/>
           </a:xfrm>
           <a:prstGeom prst="rect">
             <a:avLst/>
@@ -6618,14 +6432,14 @@
       </p:sp>
       <p:sp>
         <p:nvSpPr>
-          <p:cNvPr id="89" name="Shape 13"/>
+          <p:cNvPr id="87" name="Shape 13"/>
           <p:cNvSpPr/>
           <p:nvPr/>
         </p:nvSpPr>
         <p:spPr>
           <a:xfrm>
             <a:off x="8570880" y="3899520"/>
-            <a:ext cx="22680" cy="637560"/>
+            <a:ext cx="22320" cy="637200"/>
           </a:xfrm>
           <a:prstGeom prst="roundRect">
             <a:avLst>
@@ -6648,14 +6462,14 @@
       </p:sp>
       <p:sp>
         <p:nvSpPr>
-          <p:cNvPr id="90" name="Shape 14"/>
+          <p:cNvPr id="88" name="Shape 14"/>
           <p:cNvSpPr/>
           <p:nvPr/>
         </p:nvSpPr>
         <p:spPr>
           <a:xfrm>
             <a:off x="8377200" y="3694680"/>
-            <a:ext cx="409680" cy="409680"/>
+            <a:ext cx="409320" cy="409320"/>
           </a:xfrm>
           <a:prstGeom prst="roundRect">
             <a:avLst>
@@ -6681,14 +6495,14 @@
       </p:sp>
       <p:sp>
         <p:nvSpPr>
-          <p:cNvPr id="91" name="Text 15"/>
+          <p:cNvPr id="89" name="Text 15"/>
           <p:cNvSpPr/>
           <p:nvPr/>
         </p:nvSpPr>
         <p:spPr>
           <a:xfrm>
             <a:off x="8504640" y="3763080"/>
-            <a:ext cx="155160" cy="272880"/>
+            <a:ext cx="154800" cy="272520"/>
           </a:xfrm>
           <a:prstGeom prst="rect">
             <a:avLst/>
@@ -6736,14 +6550,14 @@
       </p:sp>
       <p:sp>
         <p:nvSpPr>
-          <p:cNvPr id="92" name="Text 16"/>
+          <p:cNvPr id="90" name="Text 16"/>
           <p:cNvSpPr/>
           <p:nvPr/>
         </p:nvSpPr>
         <p:spPr>
           <a:xfrm>
             <a:off x="7588440" y="4719600"/>
-            <a:ext cx="1987560" cy="569160"/>
+            <a:ext cx="1987200" cy="568800"/>
           </a:xfrm>
           <a:prstGeom prst="rect">
             <a:avLst/>
@@ -6791,14 +6605,14 @@
       </p:sp>
       <p:sp>
         <p:nvSpPr>
-          <p:cNvPr id="93" name="Text 17"/>
+          <p:cNvPr id="91" name="Text 17"/>
           <p:cNvSpPr/>
           <p:nvPr/>
         </p:nvSpPr>
         <p:spPr>
           <a:xfrm>
             <a:off x="7588440" y="5398560"/>
-            <a:ext cx="1987560" cy="2040840"/>
+            <a:ext cx="1987200" cy="2040480"/>
           </a:xfrm>
           <a:prstGeom prst="rect">
             <a:avLst/>
@@ -6846,14 +6660,14 @@
       </p:sp>
       <p:sp>
         <p:nvSpPr>
-          <p:cNvPr id="94" name="Shape 18"/>
+          <p:cNvPr id="92" name="Shape 18"/>
           <p:cNvSpPr/>
           <p:nvPr/>
         </p:nvSpPr>
         <p:spPr>
           <a:xfrm>
             <a:off x="11105280" y="3899520"/>
-            <a:ext cx="22680" cy="637560"/>
+            <a:ext cx="22320" cy="637200"/>
           </a:xfrm>
           <a:prstGeom prst="roundRect">
             <a:avLst>
@@ -6876,14 +6690,14 @@
       </p:sp>
       <p:sp>
         <p:nvSpPr>
-          <p:cNvPr id="95" name="Shape 19"/>
+          <p:cNvPr id="93" name="Shape 19"/>
           <p:cNvSpPr/>
           <p:nvPr/>
         </p:nvSpPr>
         <p:spPr>
           <a:xfrm>
             <a:off x="10911600" y="3694680"/>
-            <a:ext cx="409680" cy="409680"/>
+            <a:ext cx="409320" cy="409320"/>
           </a:xfrm>
           <a:prstGeom prst="roundRect">
             <a:avLst>
@@ -6909,14 +6723,14 @@
       </p:sp>
       <p:sp>
         <p:nvSpPr>
-          <p:cNvPr id="96" name="Text 20"/>
+          <p:cNvPr id="94" name="Text 20"/>
           <p:cNvSpPr/>
           <p:nvPr/>
         </p:nvSpPr>
         <p:spPr>
           <a:xfrm>
             <a:off x="11039040" y="3763080"/>
-            <a:ext cx="155160" cy="272880"/>
+            <a:ext cx="154800" cy="272520"/>
           </a:xfrm>
           <a:prstGeom prst="rect">
             <a:avLst/>
@@ -6964,14 +6778,14 @@
       </p:sp>
       <p:sp>
         <p:nvSpPr>
-          <p:cNvPr id="97" name="Text 21"/>
+          <p:cNvPr id="95" name="Text 21"/>
           <p:cNvSpPr/>
           <p:nvPr/>
         </p:nvSpPr>
         <p:spPr>
           <a:xfrm>
             <a:off x="10122840" y="4719600"/>
-            <a:ext cx="1987560" cy="853560"/>
+            <a:ext cx="1987200" cy="853200"/>
           </a:xfrm>
           <a:prstGeom prst="rect">
             <a:avLst/>
@@ -7019,14 +6833,14 @@
       </p:sp>
       <p:sp>
         <p:nvSpPr>
-          <p:cNvPr id="98" name="Text 22"/>
+          <p:cNvPr id="96" name="Text 22"/>
           <p:cNvSpPr/>
           <p:nvPr/>
         </p:nvSpPr>
         <p:spPr>
           <a:xfrm>
             <a:off x="10122840" y="5538960"/>
-            <a:ext cx="1987560" cy="2040840"/>
+            <a:ext cx="1987200" cy="2040480"/>
           </a:xfrm>
           <a:prstGeom prst="rect">
             <a:avLst/>
@@ -7104,7 +6918,7 @@
       </p:grpSpPr>
       <p:pic>
         <p:nvPicPr>
-          <p:cNvPr id="99" name="Image 0" descr="preencoded.png"/>
+          <p:cNvPr id="97" name="Image 0" descr="preencoded.png"/>
           <p:cNvPicPr/>
           <p:nvPr/>
         </p:nvPicPr>
@@ -7115,7 +6929,7 @@
         <p:spPr>
           <a:xfrm>
             <a:off x="0" y="0"/>
-            <a:ext cx="14630040" cy="8229240"/>
+            <a:ext cx="14629680" cy="8228880"/>
           </a:xfrm>
           <a:prstGeom prst="rect">
             <a:avLst/>
@@ -7127,14 +6941,14 @@
       </p:pic>
       <p:sp>
         <p:nvSpPr>
-          <p:cNvPr id="100" name="Shape 0"/>
+          <p:cNvPr id="98" name="Shape 0"/>
           <p:cNvSpPr/>
           <p:nvPr/>
         </p:nvSpPr>
         <p:spPr>
           <a:xfrm>
             <a:off x="0" y="0"/>
-            <a:ext cx="14630040" cy="8229240"/>
+            <a:ext cx="14629680" cy="8228880"/>
           </a:xfrm>
           <a:prstGeom prst="rect">
             <a:avLst/>
@@ -7157,14 +6971,14 @@
       </p:sp>
       <p:sp>
         <p:nvSpPr>
-          <p:cNvPr id="101" name="Text 1"/>
+          <p:cNvPr id="99" name="Text 1"/>
           <p:cNvSpPr/>
           <p:nvPr/>
         </p:nvSpPr>
         <p:spPr>
           <a:xfrm>
             <a:off x="864000" y="1215360"/>
-            <a:ext cx="6171840" cy="771120"/>
+            <a:ext cx="6171480" cy="770760"/>
           </a:xfrm>
           <a:prstGeom prst="rect">
             <a:avLst/>
@@ -7212,14 +7026,14 @@
       </p:sp>
       <p:sp>
         <p:nvSpPr>
-          <p:cNvPr id="102" name="Text 2"/>
+          <p:cNvPr id="100" name="Text 2"/>
           <p:cNvSpPr/>
           <p:nvPr/>
         </p:nvSpPr>
         <p:spPr>
           <a:xfrm>
             <a:off x="864000" y="2603880"/>
-            <a:ext cx="3085920" cy="385560"/>
+            <a:ext cx="3085560" cy="385200"/>
           </a:xfrm>
           <a:prstGeom prst="rect">
             <a:avLst/>
@@ -7267,14 +7081,14 @@
       </p:sp>
       <p:sp>
         <p:nvSpPr>
-          <p:cNvPr id="103" name="Text 3"/>
+          <p:cNvPr id="101" name="Text 3"/>
           <p:cNvSpPr/>
           <p:nvPr/>
         </p:nvSpPr>
         <p:spPr>
           <a:xfrm>
             <a:off x="864000" y="3236760"/>
-            <a:ext cx="3898440" cy="3160080"/>
+            <a:ext cx="3898080" cy="3159720"/>
           </a:xfrm>
           <a:prstGeom prst="rect">
             <a:avLst/>
@@ -7322,14 +7136,14 @@
       </p:sp>
       <p:sp>
         <p:nvSpPr>
-          <p:cNvPr id="104" name="Text 4"/>
+          <p:cNvPr id="102" name="Text 4"/>
           <p:cNvSpPr/>
           <p:nvPr/>
         </p:nvSpPr>
         <p:spPr>
           <a:xfrm>
             <a:off x="5372640" y="2603880"/>
-            <a:ext cx="3085920" cy="385560"/>
+            <a:ext cx="3085560" cy="385200"/>
           </a:xfrm>
           <a:prstGeom prst="rect">
             <a:avLst/>
@@ -7377,14 +7191,14 @@
       </p:sp>
       <p:sp>
         <p:nvSpPr>
-          <p:cNvPr id="105" name="Text 5"/>
+          <p:cNvPr id="103" name="Text 5"/>
           <p:cNvSpPr/>
           <p:nvPr/>
         </p:nvSpPr>
         <p:spPr>
           <a:xfrm>
             <a:off x="5372640" y="3236760"/>
-            <a:ext cx="3898440" cy="2369880"/>
+            <a:ext cx="3898080" cy="2369520"/>
           </a:xfrm>
           <a:prstGeom prst="rect">
             <a:avLst/>
@@ -7432,14 +7246,14 @@
       </p:sp>
       <p:sp>
         <p:nvSpPr>
-          <p:cNvPr id="106" name="Text 6"/>
+          <p:cNvPr id="104" name="Text 6"/>
           <p:cNvSpPr/>
           <p:nvPr/>
         </p:nvSpPr>
         <p:spPr>
           <a:xfrm>
             <a:off x="9881280" y="2603880"/>
-            <a:ext cx="3085920" cy="385560"/>
+            <a:ext cx="3085560" cy="385200"/>
           </a:xfrm>
           <a:prstGeom prst="rect">
             <a:avLst/>
@@ -7487,14 +7301,14 @@
       </p:sp>
       <p:sp>
         <p:nvSpPr>
-          <p:cNvPr id="107" name="Text 7"/>
+          <p:cNvPr id="105" name="Text 7"/>
           <p:cNvSpPr/>
           <p:nvPr/>
         </p:nvSpPr>
         <p:spPr>
           <a:xfrm>
             <a:off x="9881280" y="3236760"/>
-            <a:ext cx="3898440" cy="3555000"/>
+            <a:ext cx="3898080" cy="3554640"/>
           </a:xfrm>
           <a:prstGeom prst="rect">
             <a:avLst/>
@@ -7572,7 +7386,7 @@
       </p:grpSpPr>
       <p:pic>
         <p:nvPicPr>
-          <p:cNvPr id="108" name="Image 0" descr="preencoded.png"/>
+          <p:cNvPr id="106" name="Image 0" descr="preencoded.png"/>
           <p:cNvPicPr/>
           <p:nvPr/>
         </p:nvPicPr>
@@ -7583,7 +7397,7 @@
         <p:spPr>
           <a:xfrm>
             <a:off x="0" y="0"/>
-            <a:ext cx="14630040" cy="8229240"/>
+            <a:ext cx="14629680" cy="8228880"/>
           </a:xfrm>
           <a:prstGeom prst="rect">
             <a:avLst/>
@@ -7595,14 +7409,14 @@
       </p:pic>
       <p:sp>
         <p:nvSpPr>
-          <p:cNvPr id="109" name="Shape 0"/>
+          <p:cNvPr id="107" name="Shape 0"/>
           <p:cNvSpPr/>
           <p:nvPr/>
         </p:nvSpPr>
         <p:spPr>
           <a:xfrm>
             <a:off x="0" y="0"/>
-            <a:ext cx="14630040" cy="8229240"/>
+            <a:ext cx="14629680" cy="8228880"/>
           </a:xfrm>
           <a:prstGeom prst="rect">
             <a:avLst/>
@@ -7625,7 +7439,7 @@
       </p:sp>
       <p:pic>
         <p:nvPicPr>
-          <p:cNvPr id="110" name="Image 1" descr="preencoded.png"/>
+          <p:cNvPr id="108" name="Image 1" descr="preencoded.png"/>
           <p:cNvPicPr/>
           <p:nvPr/>
         </p:nvPicPr>
@@ -7636,7 +7450,7 @@
         <p:spPr>
           <a:xfrm>
             <a:off x="9144000" y="0"/>
-            <a:ext cx="5486040" cy="8229240"/>
+            <a:ext cx="5485680" cy="8228880"/>
           </a:xfrm>
           <a:prstGeom prst="rect">
             <a:avLst/>
@@ -7648,7 +7462,7 @@
       </p:pic>
       <p:pic>
         <p:nvPicPr>
-          <p:cNvPr id="111" name="Image 2" descr="preencoded.png"/>
+          <p:cNvPr id="109" name="Image 2" descr="preencoded.png"/>
           <p:cNvPicPr/>
           <p:nvPr/>
         </p:nvPicPr>
@@ -7659,7 +7473,7 @@
         <p:spPr>
           <a:xfrm>
             <a:off x="9360000" y="2017080"/>
-            <a:ext cx="5054040" cy="4194720"/>
+            <a:ext cx="5053680" cy="4194360"/>
           </a:xfrm>
           <a:prstGeom prst="rect">
             <a:avLst/>
@@ -7671,14 +7485,14 @@
       </p:pic>
       <p:sp>
         <p:nvSpPr>
-          <p:cNvPr id="112" name="Text 1"/>
+          <p:cNvPr id="110" name="Text 1"/>
           <p:cNvSpPr/>
           <p:nvPr/>
         </p:nvSpPr>
         <p:spPr>
           <a:xfrm>
             <a:off x="604800" y="866880"/>
-            <a:ext cx="4320360" cy="539640"/>
+            <a:ext cx="4320000" cy="539280"/>
           </a:xfrm>
           <a:prstGeom prst="rect">
             <a:avLst/>
@@ -7726,7 +7540,7 @@
       </p:sp>
       <p:pic>
         <p:nvPicPr>
-          <p:cNvPr id="113" name="Image 3" descr="preencoded.png"/>
+          <p:cNvPr id="111" name="Image 3" descr="preencoded.png"/>
           <p:cNvPicPr/>
           <p:nvPr/>
         </p:nvPicPr>
@@ -7737,7 +7551,7 @@
         <p:spPr>
           <a:xfrm>
             <a:off x="604800" y="1666080"/>
-            <a:ext cx="863640" cy="1382040"/>
+            <a:ext cx="863280" cy="1381680"/>
           </a:xfrm>
           <a:prstGeom prst="rect">
             <a:avLst/>
@@ -7749,14 +7563,14 @@
       </p:pic>
       <p:sp>
         <p:nvSpPr>
-          <p:cNvPr id="114" name="Text 2"/>
+          <p:cNvPr id="112" name="Text 2"/>
           <p:cNvSpPr/>
           <p:nvPr/>
         </p:nvSpPr>
         <p:spPr>
           <a:xfrm>
             <a:off x="1728000" y="1838880"/>
-            <a:ext cx="2289960" cy="269640"/>
+            <a:ext cx="2289600" cy="269280"/>
           </a:xfrm>
           <a:prstGeom prst="rect">
             <a:avLst/>
@@ -7804,14 +7618,14 @@
       </p:sp>
       <p:sp>
         <p:nvSpPr>
-          <p:cNvPr id="115" name="Text 3"/>
+          <p:cNvPr id="113" name="Text 3"/>
           <p:cNvSpPr/>
           <p:nvPr/>
         </p:nvSpPr>
         <p:spPr>
           <a:xfrm>
             <a:off x="1728000" y="2212560"/>
-            <a:ext cx="6810840" cy="552960"/>
+            <a:ext cx="6810480" cy="552600"/>
           </a:xfrm>
           <a:prstGeom prst="rect">
             <a:avLst/>
@@ -7859,7 +7673,7 @@
       </p:sp>
       <p:pic>
         <p:nvPicPr>
-          <p:cNvPr id="116" name="Image 4" descr="preencoded.png"/>
+          <p:cNvPr id="114" name="Image 4" descr="preencoded.png"/>
           <p:cNvPicPr/>
           <p:nvPr/>
         </p:nvPicPr>
@@ -7870,7 +7684,7 @@
         <p:spPr>
           <a:xfrm>
             <a:off x="604800" y="3048840"/>
-            <a:ext cx="863640" cy="1382040"/>
+            <a:ext cx="863280" cy="1381680"/>
           </a:xfrm>
           <a:prstGeom prst="rect">
             <a:avLst/>
@@ -7882,14 +7696,14 @@
       </p:pic>
       <p:sp>
         <p:nvSpPr>
-          <p:cNvPr id="117" name="Text 4"/>
+          <p:cNvPr id="115" name="Text 4"/>
           <p:cNvSpPr/>
           <p:nvPr/>
         </p:nvSpPr>
         <p:spPr>
           <a:xfrm>
             <a:off x="1728000" y="3221640"/>
-            <a:ext cx="2160000" cy="269640"/>
+            <a:ext cx="2159640" cy="269280"/>
           </a:xfrm>
           <a:prstGeom prst="rect">
             <a:avLst/>
@@ -7937,14 +7751,14 @@
       </p:sp>
       <p:sp>
         <p:nvSpPr>
-          <p:cNvPr id="118" name="Text 5"/>
+          <p:cNvPr id="116" name="Text 5"/>
           <p:cNvSpPr/>
           <p:nvPr/>
         </p:nvSpPr>
         <p:spPr>
           <a:xfrm>
             <a:off x="1728000" y="3594960"/>
-            <a:ext cx="6810840" cy="560520"/>
+            <a:ext cx="6810480" cy="560160"/>
           </a:xfrm>
           <a:prstGeom prst="rect">
             <a:avLst/>
@@ -8015,7 +7829,7 @@
       </p:sp>
       <p:pic>
         <p:nvPicPr>
-          <p:cNvPr id="119" name="Image 5" descr="preencoded.png"/>
+          <p:cNvPr id="117" name="Image 5" descr="preencoded.png"/>
           <p:cNvPicPr/>
           <p:nvPr/>
         </p:nvPicPr>
@@ -8026,7 +7840,7 @@
         <p:spPr>
           <a:xfrm>
             <a:off x="604800" y="4431240"/>
-            <a:ext cx="863640" cy="1548360"/>
+            <a:ext cx="863280" cy="1548000"/>
           </a:xfrm>
           <a:prstGeom prst="rect">
             <a:avLst/>
@@ -8038,14 +7852,14 @@
       </p:pic>
       <p:sp>
         <p:nvSpPr>
-          <p:cNvPr id="120" name="Text 6"/>
+          <p:cNvPr id="118" name="Text 6"/>
           <p:cNvSpPr/>
           <p:nvPr/>
         </p:nvSpPr>
         <p:spPr>
           <a:xfrm>
             <a:off x="1728000" y="4604040"/>
-            <a:ext cx="2160000" cy="269640"/>
+            <a:ext cx="2159640" cy="269280"/>
           </a:xfrm>
           <a:prstGeom prst="rect">
             <a:avLst/>
@@ -8093,14 +7907,14 @@
       </p:sp>
       <p:sp>
         <p:nvSpPr>
-          <p:cNvPr id="121" name="Text 7"/>
+          <p:cNvPr id="119" name="Text 7"/>
           <p:cNvSpPr/>
           <p:nvPr/>
         </p:nvSpPr>
         <p:spPr>
           <a:xfrm>
             <a:off x="1728000" y="4977360"/>
-            <a:ext cx="6810840" cy="829440"/>
+            <a:ext cx="6810480" cy="829080"/>
           </a:xfrm>
           <a:prstGeom prst="rect">
             <a:avLst/>
@@ -8148,7 +7962,7 @@
       </p:sp>
       <p:pic>
         <p:nvPicPr>
-          <p:cNvPr id="122" name="Image 6" descr="preencoded.png"/>
+          <p:cNvPr id="120" name="Image 6" descr="preencoded.png"/>
           <p:cNvPicPr/>
           <p:nvPr/>
         </p:nvPicPr>
@@ -8159,7 +7973,7 @@
         <p:spPr>
           <a:xfrm>
             <a:off x="604800" y="5979960"/>
-            <a:ext cx="863640" cy="1382040"/>
+            <a:ext cx="863280" cy="1381680"/>
           </a:xfrm>
           <a:prstGeom prst="rect">
             <a:avLst/>
@@ -8171,14 +7985,14 @@
       </p:pic>
       <p:sp>
         <p:nvSpPr>
-          <p:cNvPr id="123" name="Text 8"/>
+          <p:cNvPr id="121" name="Text 8"/>
           <p:cNvSpPr/>
           <p:nvPr/>
         </p:nvSpPr>
         <p:spPr>
           <a:xfrm>
             <a:off x="1728000" y="6152760"/>
-            <a:ext cx="2160000" cy="269640"/>
+            <a:ext cx="2159640" cy="269280"/>
           </a:xfrm>
           <a:prstGeom prst="rect">
             <a:avLst/>
@@ -8226,14 +8040,14 @@
       </p:sp>
       <p:sp>
         <p:nvSpPr>
-          <p:cNvPr id="124" name="Text 9"/>
+          <p:cNvPr id="122" name="Text 9"/>
           <p:cNvSpPr/>
           <p:nvPr/>
         </p:nvSpPr>
         <p:spPr>
           <a:xfrm>
             <a:off x="1728000" y="6526440"/>
-            <a:ext cx="6810840" cy="552960"/>
+            <a:ext cx="6810480" cy="552600"/>
           </a:xfrm>
           <a:prstGeom prst="rect">
             <a:avLst/>
@@ -8311,7 +8125,7 @@
       </p:grpSpPr>
       <p:pic>
         <p:nvPicPr>
-          <p:cNvPr id="125" name="Image 0" descr="preencoded.png"/>
+          <p:cNvPr id="123" name="Image 0" descr="preencoded.png"/>
           <p:cNvPicPr/>
           <p:nvPr/>
         </p:nvPicPr>
@@ -8322,7 +8136,7 @@
         <p:spPr>
           <a:xfrm>
             <a:off x="0" y="0"/>
-            <a:ext cx="14630040" cy="8229240"/>
+            <a:ext cx="14629680" cy="8228880"/>
           </a:xfrm>
           <a:prstGeom prst="rect">
             <a:avLst/>
@@ -8334,14 +8148,14 @@
       </p:pic>
       <p:sp>
         <p:nvSpPr>
-          <p:cNvPr id="126" name="Shape 0"/>
+          <p:cNvPr id="124" name="Shape 0"/>
           <p:cNvSpPr/>
           <p:nvPr/>
         </p:nvSpPr>
         <p:spPr>
           <a:xfrm>
             <a:off x="0" y="0"/>
-            <a:ext cx="14630040" cy="8231760"/>
+            <a:ext cx="14629680" cy="8231400"/>
           </a:xfrm>
           <a:prstGeom prst="rect">
             <a:avLst/>
@@ -8364,14 +8178,14 @@
       </p:sp>
       <p:sp>
         <p:nvSpPr>
-          <p:cNvPr id="127" name="Text 1"/>
+          <p:cNvPr id="125" name="Text 1"/>
           <p:cNvSpPr/>
           <p:nvPr/>
         </p:nvSpPr>
         <p:spPr>
           <a:xfrm>
             <a:off x="2453760" y="489600"/>
-            <a:ext cx="4449600" cy="555840"/>
+            <a:ext cx="4449240" cy="555480"/>
           </a:xfrm>
           <a:prstGeom prst="rect">
             <a:avLst/>
@@ -8419,7 +8233,7 @@
       </p:sp>
       <p:pic>
         <p:nvPicPr>
-          <p:cNvPr id="128" name="Image 1" descr="preencoded.png"/>
+          <p:cNvPr id="126" name="Image 1" descr="preencoded.png"/>
           <p:cNvPicPr/>
           <p:nvPr/>
         </p:nvPicPr>
@@ -8430,7 +8244,7 @@
         <p:spPr>
           <a:xfrm>
             <a:off x="2453760" y="1401480"/>
-            <a:ext cx="8454240" cy="6340680"/>
+            <a:ext cx="8453880" cy="6340320"/>
           </a:xfrm>
           <a:prstGeom prst="rect">
             <a:avLst/>
@@ -8472,7 +8286,7 @@
       </p:grpSpPr>
       <p:pic>
         <p:nvPicPr>
-          <p:cNvPr id="129" name="Image 0" descr="preencoded.png"/>
+          <p:cNvPr id="127" name="Image 0" descr="preencoded.png"/>
           <p:cNvPicPr/>
           <p:nvPr/>
         </p:nvPicPr>
@@ -8483,7 +8297,7 @@
         <p:spPr>
           <a:xfrm>
             <a:off x="0" y="0"/>
-            <a:ext cx="14630040" cy="8229240"/>
+            <a:ext cx="14629680" cy="8228880"/>
           </a:xfrm>
           <a:prstGeom prst="rect">
             <a:avLst/>
@@ -8495,14 +8309,14 @@
       </p:pic>
       <p:sp>
         <p:nvSpPr>
-          <p:cNvPr id="130" name="Shape 0"/>
+          <p:cNvPr id="128" name="Shape 0"/>
           <p:cNvSpPr/>
           <p:nvPr/>
         </p:nvSpPr>
         <p:spPr>
           <a:xfrm>
             <a:off x="0" y="0"/>
-            <a:ext cx="14630040" cy="8229240"/>
+            <a:ext cx="14629680" cy="8228880"/>
           </a:xfrm>
           <a:prstGeom prst="rect">
             <a:avLst/>
@@ -8525,14 +8339,14 @@
       </p:sp>
       <p:sp>
         <p:nvSpPr>
-          <p:cNvPr id="131" name="Text 1"/>
+          <p:cNvPr id="129" name="Text 1"/>
           <p:cNvSpPr/>
           <p:nvPr/>
         </p:nvSpPr>
         <p:spPr>
           <a:xfrm>
             <a:off x="864000" y="1108080"/>
-            <a:ext cx="6996960" cy="771120"/>
+            <a:ext cx="6996600" cy="770760"/>
           </a:xfrm>
           <a:prstGeom prst="rect">
             <a:avLst/>
@@ -8580,14 +8394,14 @@
       </p:sp>
       <p:sp>
         <p:nvSpPr>
-          <p:cNvPr id="132" name="Shape 2"/>
+          <p:cNvPr id="130" name="Shape 2"/>
           <p:cNvSpPr/>
           <p:nvPr/>
         </p:nvSpPr>
         <p:spPr>
           <a:xfrm>
             <a:off x="864000" y="2373120"/>
-            <a:ext cx="12902040" cy="4747680"/>
+            <a:ext cx="12901680" cy="4747320"/>
           </a:xfrm>
           <a:prstGeom prst="roundRect">
             <a:avLst>
@@ -8613,14 +8427,14 @@
       </p:sp>
       <p:sp>
         <p:nvSpPr>
-          <p:cNvPr id="133" name="Shape 3"/>
+          <p:cNvPr id="131" name="Shape 3"/>
           <p:cNvSpPr/>
           <p:nvPr/>
         </p:nvSpPr>
         <p:spPr>
           <a:xfrm>
             <a:off x="879120" y="2388600"/>
-            <a:ext cx="12871440" cy="706320"/>
+            <a:ext cx="12871080" cy="705960"/>
           </a:xfrm>
           <a:prstGeom prst="rect">
             <a:avLst/>
@@ -8643,14 +8457,14 @@
       </p:sp>
       <p:sp>
         <p:nvSpPr>
-          <p:cNvPr id="134" name="Text 4"/>
+          <p:cNvPr id="132" name="Text 4"/>
           <p:cNvSpPr/>
           <p:nvPr/>
         </p:nvSpPr>
         <p:spPr>
           <a:xfrm>
             <a:off x="1126080" y="2544120"/>
-            <a:ext cx="5938200" cy="394560"/>
+            <a:ext cx="5937840" cy="394200"/>
           </a:xfrm>
           <a:prstGeom prst="rect">
             <a:avLst/>
@@ -8698,14 +8512,14 @@
       </p:sp>
       <p:sp>
         <p:nvSpPr>
-          <p:cNvPr id="135" name="Text 5"/>
+          <p:cNvPr id="133" name="Text 5"/>
           <p:cNvSpPr/>
           <p:nvPr/>
         </p:nvSpPr>
         <p:spPr>
           <a:xfrm>
             <a:off x="7565760" y="2544120"/>
-            <a:ext cx="5938200" cy="394560"/>
+            <a:ext cx="5937840" cy="394200"/>
           </a:xfrm>
           <a:prstGeom prst="rect">
             <a:avLst/>
@@ -8753,14 +8567,14 @@
       </p:sp>
       <p:sp>
         <p:nvSpPr>
-          <p:cNvPr id="136" name="Shape 6"/>
+          <p:cNvPr id="134" name="Shape 6"/>
           <p:cNvSpPr/>
           <p:nvPr/>
         </p:nvSpPr>
         <p:spPr>
           <a:xfrm>
             <a:off x="879120" y="3094920"/>
-            <a:ext cx="12871440" cy="706320"/>
+            <a:ext cx="12871080" cy="705960"/>
           </a:xfrm>
           <a:prstGeom prst="rect">
             <a:avLst/>
@@ -8783,14 +8597,14 @@
       </p:sp>
       <p:sp>
         <p:nvSpPr>
-          <p:cNvPr id="137" name="Text 7"/>
+          <p:cNvPr id="135" name="Text 7"/>
           <p:cNvSpPr/>
           <p:nvPr/>
         </p:nvSpPr>
         <p:spPr>
           <a:xfrm>
             <a:off x="1126080" y="3250800"/>
-            <a:ext cx="5938200" cy="394560"/>
+            <a:ext cx="5937840" cy="394200"/>
           </a:xfrm>
           <a:prstGeom prst="rect">
             <a:avLst/>
@@ -8838,14 +8652,14 @@
       </p:sp>
       <p:sp>
         <p:nvSpPr>
-          <p:cNvPr id="138" name="Text 8"/>
+          <p:cNvPr id="136" name="Text 8"/>
           <p:cNvSpPr/>
           <p:nvPr/>
         </p:nvSpPr>
         <p:spPr>
           <a:xfrm>
             <a:off x="7565760" y="3142800"/>
-            <a:ext cx="5938200" cy="394560"/>
+            <a:ext cx="5937840" cy="394200"/>
           </a:xfrm>
           <a:prstGeom prst="rect">
             <a:avLst/>
@@ -8893,14 +8707,14 @@
       </p:sp>
       <p:sp>
         <p:nvSpPr>
-          <p:cNvPr id="139" name="Shape 9"/>
+          <p:cNvPr id="137" name="Shape 9"/>
           <p:cNvSpPr/>
           <p:nvPr/>
         </p:nvSpPr>
         <p:spPr>
           <a:xfrm>
             <a:off x="879120" y="3837600"/>
-            <a:ext cx="12871440" cy="1101240"/>
+            <a:ext cx="12871080" cy="1100880"/>
           </a:xfrm>
           <a:prstGeom prst="rect">
             <a:avLst/>
@@ -8923,14 +8737,14 @@
       </p:sp>
       <p:sp>
         <p:nvSpPr>
-          <p:cNvPr id="140" name="Text 10"/>
+          <p:cNvPr id="138" name="Text 10"/>
           <p:cNvSpPr/>
           <p:nvPr/>
         </p:nvSpPr>
         <p:spPr>
           <a:xfrm>
             <a:off x="1126080" y="3957120"/>
-            <a:ext cx="5938200" cy="394560"/>
+            <a:ext cx="5937840" cy="394200"/>
           </a:xfrm>
           <a:prstGeom prst="rect">
             <a:avLst/>
@@ -8978,14 +8792,14 @@
       </p:sp>
       <p:sp>
         <p:nvSpPr>
-          <p:cNvPr id="141" name="Text 11"/>
+          <p:cNvPr id="139" name="Text 11"/>
           <p:cNvSpPr/>
           <p:nvPr/>
         </p:nvSpPr>
         <p:spPr>
           <a:xfrm>
             <a:off x="7565760" y="3669120"/>
-            <a:ext cx="5938200" cy="789840"/>
+            <a:ext cx="5937840" cy="789480"/>
           </a:xfrm>
           <a:prstGeom prst="rect">
             <a:avLst/>
@@ -9033,14 +8847,14 @@
       </p:sp>
       <p:sp>
         <p:nvSpPr>
-          <p:cNvPr id="142" name="Shape 12"/>
+          <p:cNvPr id="140" name="Shape 12"/>
           <p:cNvSpPr/>
           <p:nvPr/>
         </p:nvSpPr>
         <p:spPr>
           <a:xfrm>
             <a:off x="879120" y="4903200"/>
-            <a:ext cx="12871440" cy="1101240"/>
+            <a:ext cx="12871080" cy="1100880"/>
           </a:xfrm>
           <a:prstGeom prst="rect">
             <a:avLst/>
@@ -9063,14 +8877,14 @@
       </p:sp>
       <p:sp>
         <p:nvSpPr>
-          <p:cNvPr id="143" name="Text 13"/>
+          <p:cNvPr id="141" name="Text 13"/>
           <p:cNvSpPr/>
           <p:nvPr/>
         </p:nvSpPr>
         <p:spPr>
           <a:xfrm>
             <a:off x="1126080" y="5058720"/>
-            <a:ext cx="5938200" cy="394560"/>
+            <a:ext cx="5937840" cy="394200"/>
           </a:xfrm>
           <a:prstGeom prst="rect">
             <a:avLst/>
@@ -9118,14 +8932,14 @@
       </p:sp>
       <p:sp>
         <p:nvSpPr>
-          <p:cNvPr id="144" name="Text 14"/>
+          <p:cNvPr id="142" name="Text 14"/>
           <p:cNvSpPr/>
           <p:nvPr/>
         </p:nvSpPr>
         <p:spPr>
           <a:xfrm>
             <a:off x="7565760" y="4950720"/>
-            <a:ext cx="5938200" cy="789840"/>
+            <a:ext cx="5937840" cy="789480"/>
           </a:xfrm>
           <a:prstGeom prst="rect">
             <a:avLst/>
@@ -9173,14 +8987,14 @@
       </p:sp>
       <p:sp>
         <p:nvSpPr>
-          <p:cNvPr id="145" name="Shape 15"/>
+          <p:cNvPr id="143" name="Shape 15"/>
           <p:cNvSpPr/>
           <p:nvPr/>
         </p:nvSpPr>
         <p:spPr>
           <a:xfrm>
             <a:off x="879120" y="6004800"/>
-            <a:ext cx="12871440" cy="1101240"/>
+            <a:ext cx="12871080" cy="1100880"/>
           </a:xfrm>
           <a:prstGeom prst="rect">
             <a:avLst/>
@@ -9203,14 +9017,14 @@
       </p:sp>
       <p:sp>
         <p:nvSpPr>
-          <p:cNvPr id="146" name="Text 16"/>
+          <p:cNvPr id="144" name="Text 16"/>
           <p:cNvSpPr/>
           <p:nvPr/>
         </p:nvSpPr>
         <p:spPr>
           <a:xfrm>
             <a:off x="1126080" y="6160320"/>
-            <a:ext cx="5938200" cy="394560"/>
+            <a:ext cx="5937840" cy="394200"/>
           </a:xfrm>
           <a:prstGeom prst="rect">
             <a:avLst/>
@@ -9258,14 +9072,14 @@
       </p:sp>
       <p:sp>
         <p:nvSpPr>
-          <p:cNvPr id="147" name="Text 17"/>
+          <p:cNvPr id="145" name="Text 17"/>
           <p:cNvSpPr/>
           <p:nvPr/>
         </p:nvSpPr>
         <p:spPr>
           <a:xfrm>
             <a:off x="7565760" y="5836320"/>
-            <a:ext cx="5938200" cy="789840"/>
+            <a:ext cx="5937840" cy="789480"/>
           </a:xfrm>
           <a:prstGeom prst="rect">
             <a:avLst/>
@@ -9343,7 +9157,7 @@
       </p:grpSpPr>
       <p:pic>
         <p:nvPicPr>
-          <p:cNvPr id="148" name="Image 0" descr="preencoded.png"/>
+          <p:cNvPr id="146" name="Image 0" descr="preencoded.png"/>
           <p:cNvPicPr/>
           <p:nvPr/>
         </p:nvPicPr>
@@ -9354,7 +9168,7 @@
         <p:spPr>
           <a:xfrm>
             <a:off x="0" y="0"/>
-            <a:ext cx="14630040" cy="8229240"/>
+            <a:ext cx="14629680" cy="8228880"/>
           </a:xfrm>
           <a:prstGeom prst="rect">
             <a:avLst/>
@@ -9366,14 +9180,14 @@
       </p:pic>
       <p:sp>
         <p:nvSpPr>
-          <p:cNvPr id="149" name="Shape 0"/>
+          <p:cNvPr id="147" name="Shape 0"/>
           <p:cNvSpPr/>
           <p:nvPr/>
         </p:nvSpPr>
         <p:spPr>
           <a:xfrm>
             <a:off x="0" y="0"/>
-            <a:ext cx="14630040" cy="8229600"/>
+            <a:ext cx="14629680" cy="8229240"/>
           </a:xfrm>
           <a:prstGeom prst="rect">
             <a:avLst/>
@@ -9396,14 +9210,14 @@
       </p:sp>
       <p:sp>
         <p:nvSpPr>
-          <p:cNvPr id="150" name="Text 1"/>
+          <p:cNvPr id="148" name="Text 1"/>
           <p:cNvSpPr/>
           <p:nvPr/>
         </p:nvSpPr>
         <p:spPr>
           <a:xfrm>
             <a:off x="2424240" y="492480"/>
-            <a:ext cx="4476240" cy="559080"/>
+            <a:ext cx="4475880" cy="558720"/>
           </a:xfrm>
           <a:prstGeom prst="rect">
             <a:avLst/>
@@ -9451,7 +9265,7 @@
       </p:sp>
       <p:pic>
         <p:nvPicPr>
-          <p:cNvPr id="151" name="Image 1" descr="preencoded.png"/>
+          <p:cNvPr id="149" name="Image 1" descr="preencoded.png"/>
           <p:cNvPicPr/>
           <p:nvPr/>
         </p:nvPicPr>
@@ -9462,7 +9276,7 @@
         <p:spPr>
           <a:xfrm>
             <a:off x="2424240" y="1410120"/>
-            <a:ext cx="8435880" cy="6327000"/>
+            <a:ext cx="8435520" cy="6326640"/>
           </a:xfrm>
           <a:prstGeom prst="rect">
             <a:avLst/>
@@ -9504,7 +9318,7 @@
       </p:grpSpPr>
       <p:pic>
         <p:nvPicPr>
-          <p:cNvPr id="152" name="Image 0" descr="preencoded.png"/>
+          <p:cNvPr id="150" name="Image 0" descr="preencoded.png"/>
           <p:cNvPicPr/>
           <p:nvPr/>
         </p:nvPicPr>
@@ -9515,7 +9329,7 @@
         <p:spPr>
           <a:xfrm>
             <a:off x="0" y="0"/>
-            <a:ext cx="14630040" cy="8229240"/>
+            <a:ext cx="14629680" cy="8228880"/>
           </a:xfrm>
           <a:prstGeom prst="rect">
             <a:avLst/>
@@ -9527,14 +9341,14 @@
       </p:pic>
       <p:sp>
         <p:nvSpPr>
-          <p:cNvPr id="153" name="Shape 0"/>
+          <p:cNvPr id="151" name="Shape 0"/>
           <p:cNvSpPr/>
           <p:nvPr/>
         </p:nvSpPr>
         <p:spPr>
           <a:xfrm>
             <a:off x="0" y="0"/>
-            <a:ext cx="14630040" cy="8229240"/>
+            <a:ext cx="14629680" cy="8228880"/>
           </a:xfrm>
           <a:prstGeom prst="rect">
             <a:avLst/>
@@ -9557,14 +9371,14 @@
       </p:sp>
       <p:sp>
         <p:nvSpPr>
-          <p:cNvPr id="154" name="Text 1"/>
+          <p:cNvPr id="152" name="Text 1"/>
           <p:cNvSpPr/>
           <p:nvPr/>
         </p:nvSpPr>
         <p:spPr>
           <a:xfrm>
             <a:off x="1571760" y="579600"/>
-            <a:ext cx="5256720" cy="656640"/>
+            <a:ext cx="5256360" cy="656280"/>
           </a:xfrm>
           <a:prstGeom prst="rect">
             <a:avLst/>
@@ -9612,7 +9426,7 @@
       </p:sp>
       <p:pic>
         <p:nvPicPr>
-          <p:cNvPr id="155" name="Image 1" descr="preencoded.png"/>
+          <p:cNvPr id="153" name="Image 1" descr="preencoded.png"/>
           <p:cNvPicPr/>
           <p:nvPr/>
         </p:nvPicPr>
@@ -9623,7 +9437,7 @@
         <p:spPr>
           <a:xfrm>
             <a:off x="1571760" y="1657080"/>
-            <a:ext cx="9988200" cy="5992560"/>
+            <a:ext cx="9987840" cy="5992200"/>
           </a:xfrm>
           <a:prstGeom prst="rect">
             <a:avLst/>

</xml_diff>